<commit_message>
changes in Workshop 4
- changed PPTX file
- change INO file for workshop
</commit_message>
<xml_diff>
--- a/Workshop 4/Arduino_Workshop_FabLab_4.pptx
+++ b/Workshop 4/Arduino_Workshop_FabLab_4.pptx
@@ -27,8 +27,8 @@
     <p:sldId id="307" r:id="rId18"/>
     <p:sldId id="308" r:id="rId19"/>
     <p:sldId id="309" r:id="rId20"/>
-    <p:sldId id="310" r:id="rId21"/>
-    <p:sldId id="311" r:id="rId22"/>
+    <p:sldId id="311" r:id="rId21"/>
+    <p:sldId id="310" r:id="rId22"/>
     <p:sldId id="312" r:id="rId23"/>
     <p:sldId id="277" r:id="rId24"/>
   </p:sldIdLst>
@@ -219,7 +219,7 @@
           <a:p>
             <a:fld id="{5565C899-D94F-7D46-B594-C1ABC82DBD78}" type="datetimeFigureOut">
               <a:rPr lang="cs-CZ" smtClean="0"/>
-              <a:t>07.08.2018</a:t>
+              <a:t>30.10.2019</a:t>
             </a:fld>
             <a:endParaRPr lang="cs-CZ"/>
           </a:p>
@@ -1364,6 +1364,14 @@
           <a:bodyPr/>
           <a:lstStyle/>
           <a:p>
+            <a:r>
+              <a:rPr lang="cs-CZ" dirty="0" smtClean="0"/>
+              <a:t>Abychom zde ušetřili</a:t>
+            </a:r>
+            <a:r>
+              <a:rPr lang="cs-CZ" baseline="0" dirty="0" smtClean="0"/>
+              <a:t> čas, tak si prosím na svých noteboocích otevřete tuto adresu a postupujte podle návodu na této adrese. Pokud by jste si s něčím nevěděli rady, tak se zeptejte a my Vám rádi pomůžeme. </a:t>
+            </a:r>
             <a:endParaRPr lang="cs-CZ" dirty="0"/>
           </a:p>
         </p:txBody>
@@ -1394,7 +1402,7 @@
     </p:spTree>
     <p:extLst>
       <p:ext uri="{BB962C8B-B14F-4D97-AF65-F5344CB8AC3E}">
-        <p14:creationId xmlns:p14="http://schemas.microsoft.com/office/powerpoint/2010/main" val="3069118016"/>
+        <p14:creationId xmlns:p14="http://schemas.microsoft.com/office/powerpoint/2010/main" val="4212357299"/>
       </p:ext>
     </p:extLst>
   </p:cSld>
@@ -1448,22 +1456,6 @@
           <a:bodyPr/>
           <a:lstStyle/>
           <a:p>
-            <a:r>
-              <a:rPr lang="cs-CZ" dirty="0" smtClean="0"/>
-              <a:t>Abychom zde ušetřili</a:t>
-            </a:r>
-            <a:r>
-              <a:rPr lang="cs-CZ" baseline="0" dirty="0" smtClean="0"/>
-              <a:t> čas, tak si prosím na svých noteboocích otevřete tuto adresu </a:t>
-            </a:r>
-            <a:r>
-              <a:rPr lang="cs-CZ" baseline="0" dirty="0" smtClean="0"/>
-              <a:t>a postupujte podle návodu na této adrese. </a:t>
-            </a:r>
-            <a:r>
-              <a:rPr lang="cs-CZ" baseline="0" dirty="0" smtClean="0"/>
-              <a:t>Pokud by jste si s něčím nevěděli rady, tak se zeptejte a my Vám rádi pomůžeme. </a:t>
-            </a:r>
             <a:endParaRPr lang="cs-CZ" dirty="0"/>
           </a:p>
         </p:txBody>
@@ -1494,7 +1486,7 @@
     </p:spTree>
     <p:extLst>
       <p:ext uri="{BB962C8B-B14F-4D97-AF65-F5344CB8AC3E}">
-        <p14:creationId xmlns:p14="http://schemas.microsoft.com/office/powerpoint/2010/main" val="4212357299"/>
+        <p14:creationId xmlns:p14="http://schemas.microsoft.com/office/powerpoint/2010/main" val="3069118016"/>
       </p:ext>
     </p:extLst>
   </p:cSld>
@@ -2971,7 +2963,7 @@
           <a:p>
             <a:fld id="{E752CAA9-96B5-3F44-8A42-6EEA579E4FCD}" type="datetime1">
               <a:rPr lang="cs-CZ" smtClean="0"/>
-              <a:t>07.08.2018</a:t>
+              <a:t>30.10.2019</a:t>
             </a:fld>
             <a:endParaRPr lang="en-US" dirty="0"/>
           </a:p>
@@ -3263,7 +3255,7 @@
           <a:p>
             <a:fld id="{31BCB585-F258-124F-BF7F-FA207A78F0F2}" type="datetime1">
               <a:rPr lang="cs-CZ" smtClean="0"/>
-              <a:t>07.08.2018</a:t>
+              <a:t>30.10.2019</a:t>
             </a:fld>
             <a:endParaRPr lang="en-US" dirty="0"/>
           </a:p>
@@ -3507,7 +3499,7 @@
           <a:p>
             <a:fld id="{74A2C75C-B480-A040-9D29-6C5EF76D9131}" type="datetime1">
               <a:rPr lang="cs-CZ" smtClean="0"/>
-              <a:t>07.08.2018</a:t>
+              <a:t>30.10.2019</a:t>
             </a:fld>
             <a:endParaRPr lang="en-US" dirty="0"/>
           </a:p>
@@ -4043,7 +4035,7 @@
           <a:p>
             <a:fld id="{342646FB-3663-324F-AA98-002615AED444}" type="datetime1">
               <a:rPr lang="cs-CZ" smtClean="0"/>
-              <a:t>07.08.2018</a:t>
+              <a:t>30.10.2019</a:t>
             </a:fld>
             <a:endParaRPr lang="en-US" dirty="0"/>
           </a:p>
@@ -4287,7 +4279,7 @@
           <a:p>
             <a:fld id="{EF064C2B-6E82-D64E-856C-3232E0DCFB45}" type="datetime1">
               <a:rPr lang="cs-CZ" smtClean="0"/>
-              <a:t>07.08.2018</a:t>
+              <a:t>30.10.2019</a:t>
             </a:fld>
             <a:endParaRPr lang="en-US" dirty="0"/>
           </a:p>
@@ -4815,7 +4807,7 @@
           <a:p>
             <a:fld id="{293EAD05-184E-964C-B1C5-0655002530B6}" type="datetime1">
               <a:rPr lang="cs-CZ" smtClean="0"/>
-              <a:t>07.08.2018</a:t>
+              <a:t>30.10.2019</a:t>
             </a:fld>
             <a:endParaRPr lang="en-US" dirty="0"/>
           </a:p>
@@ -5108,7 +5100,7 @@
           <a:p>
             <a:fld id="{7C9DCF0A-7AEA-A34F-B7C0-F6B9FF3A3646}" type="datetime1">
               <a:rPr lang="cs-CZ" smtClean="0"/>
-              <a:t>07.08.2018</a:t>
+              <a:t>30.10.2019</a:t>
             </a:fld>
             <a:endParaRPr lang="en-US" dirty="0"/>
           </a:p>
@@ -5278,7 +5270,7 @@
           <a:p>
             <a:fld id="{74F5DF92-8455-E84E-879C-71323DEF0ADF}" type="datetime1">
               <a:rPr lang="cs-CZ" smtClean="0"/>
-              <a:t>07.08.2018</a:t>
+              <a:t>30.10.2019</a:t>
             </a:fld>
             <a:endParaRPr lang="en-US" dirty="0"/>
           </a:p>
@@ -5454,7 +5446,7 @@
           <a:p>
             <a:fld id="{D055ED42-00BF-3C45-8E36-A23DE53A8289}" type="datetime1">
               <a:rPr lang="cs-CZ" smtClean="0"/>
-              <a:t>07.08.2018</a:t>
+              <a:t>30.10.2019</a:t>
             </a:fld>
             <a:endParaRPr lang="en-US" dirty="0"/>
           </a:p>
@@ -5620,7 +5612,7 @@
           <a:p>
             <a:fld id="{2EF1BBEC-19BE-5C49-BA0D-CF19E5B9B00E}" type="datetime1">
               <a:rPr lang="cs-CZ" smtClean="0"/>
-              <a:t>07.08.2018</a:t>
+              <a:t>30.10.2019</a:t>
             </a:fld>
             <a:endParaRPr lang="en-US" dirty="0"/>
           </a:p>
@@ -5867,7 +5859,7 @@
           <a:p>
             <a:fld id="{178088CD-723A-8B40-89D7-89660B3DD48D}" type="datetime1">
               <a:rPr lang="cs-CZ" smtClean="0"/>
-              <a:t>07.08.2018</a:t>
+              <a:t>30.10.2019</a:t>
             </a:fld>
             <a:endParaRPr lang="en-US" dirty="0"/>
           </a:p>
@@ -6160,7 +6152,7 @@
           <a:p>
             <a:fld id="{D4204A87-6492-9A48-9499-30EDE7034375}" type="datetime1">
               <a:rPr lang="cs-CZ" smtClean="0"/>
-              <a:t>07.08.2018</a:t>
+              <a:t>30.10.2019</a:t>
             </a:fld>
             <a:endParaRPr lang="en-US" dirty="0"/>
           </a:p>
@@ -6598,7 +6590,7 @@
           <a:p>
             <a:fld id="{07FC920A-F3B2-0642-BA2E-597E2BA2EB95}" type="datetime1">
               <a:rPr lang="cs-CZ" smtClean="0"/>
-              <a:t>07.08.2018</a:t>
+              <a:t>30.10.2019</a:t>
             </a:fld>
             <a:endParaRPr lang="en-US" dirty="0"/>
           </a:p>
@@ -6712,7 +6704,7 @@
           <a:p>
             <a:fld id="{089458EC-3233-5446-BD35-5BD03E3B392A}" type="datetime1">
               <a:rPr lang="cs-CZ" smtClean="0"/>
-              <a:t>07.08.2018</a:t>
+              <a:t>30.10.2019</a:t>
             </a:fld>
             <a:endParaRPr lang="en-US" dirty="0"/>
           </a:p>
@@ -6803,7 +6795,7 @@
           <a:p>
             <a:fld id="{12FEC062-09BC-624D-9A51-18C9FAD2F1D8}" type="datetime1">
               <a:rPr lang="cs-CZ" smtClean="0"/>
-              <a:t>07.08.2018</a:t>
+              <a:t>30.10.2019</a:t>
             </a:fld>
             <a:endParaRPr lang="en-US" dirty="0"/>
           </a:p>
@@ -7082,7 +7074,7 @@
           <a:p>
             <a:fld id="{877420B1-C1EC-5C4E-944B-F4F6A88A080C}" type="datetime1">
               <a:rPr lang="cs-CZ" smtClean="0"/>
-              <a:t>07.08.2018</a:t>
+              <a:t>30.10.2019</a:t>
             </a:fld>
             <a:endParaRPr lang="en-US" dirty="0"/>
           </a:p>
@@ -7369,7 +7361,7 @@
           <a:p>
             <a:fld id="{D15B0330-CF02-7D4F-B4D9-CB68A09CF1DF}" type="datetime1">
               <a:rPr lang="cs-CZ" smtClean="0"/>
-              <a:t>07.08.2018</a:t>
+              <a:t>30.10.2019</a:t>
             </a:fld>
             <a:endParaRPr lang="en-US" dirty="0"/>
           </a:p>
@@ -7895,7 +7887,7 @@
           <a:p>
             <a:fld id="{6ECF23EE-C21C-644B-BBE9-CAEDE10E2CFC}" type="datetime1">
               <a:rPr lang="cs-CZ" smtClean="0"/>
-              <a:t>07.08.2018</a:t>
+              <a:t>30.10.2019</a:t>
             </a:fld>
             <a:endParaRPr lang="en-US" dirty="0"/>
           </a:p>
@@ -12895,8 +12887,20 @@
           </a:lstStyle>
           <a:p>
             <a:r>
+              <a:rPr lang="cs-CZ" dirty="0" err="1" smtClean="0"/>
+              <a:t>Arduino</a:t>
+            </a:r>
+            <a:r>
               <a:rPr lang="cs-CZ" dirty="0" smtClean="0"/>
-              <a:t>Zapojení součástek</a:t>
+              <a:t> IDE - </a:t>
+            </a:r>
+            <a:r>
+              <a:rPr lang="cs-CZ" dirty="0" err="1" smtClean="0"/>
+              <a:t>sketch</a:t>
+            </a:r>
+            <a:r>
+              <a:rPr lang="cs-CZ" dirty="0" smtClean="0"/>
+              <a:t> </a:t>
             </a:r>
             <a:endParaRPr lang="cs-CZ" dirty="0"/>
           </a:p>
@@ -12914,8 +12918,8 @@
         </p:nvSpPr>
         <p:spPr>
           <a:xfrm>
-            <a:off x="7875683" y="6001103"/>
-            <a:ext cx="712135" cy="462306"/>
+            <a:off x="1484310" y="715651"/>
+            <a:ext cx="10018713" cy="5666295"/>
           </a:xfrm>
         </p:spPr>
         <p:txBody>
@@ -12924,840 +12928,225 @@
           </a:bodyPr>
           <a:lstStyle/>
           <a:p>
-            <a:pPr marL="0" indent="0">
-              <a:buNone/>
-            </a:pPr>
-            <a:r>
-              <a:rPr lang="cs-CZ" sz="1600" dirty="0" smtClean="0"/>
-              <a:t>Pin 14</a:t>
-            </a:r>
-            <a:endParaRPr lang="cs-CZ" sz="1600" dirty="0"/>
-          </a:p>
-        </p:txBody>
-      </p:sp>
-      <p:pic>
-        <p:nvPicPr>
-          <p:cNvPr id="3" name="Obrázek 2"/>
-          <p:cNvPicPr>
-            <a:picLocks noChangeAspect="1"/>
-          </p:cNvPicPr>
+            <a:endParaRPr lang="cs-CZ" dirty="0" smtClean="0"/>
+          </a:p>
+          <a:p>
+            <a:r>
+              <a:rPr lang="cs-CZ" dirty="0" smtClean="0"/>
+              <a:t>Podpora pro ESP32: </a:t>
+            </a:r>
+            <a:r>
+              <a:rPr lang="cs-CZ" dirty="0">
+                <a:hlinkClick r:id="rId3"/>
+              </a:rPr>
+              <a:t>https://</a:t>
+            </a:r>
+            <a:r>
+              <a:rPr lang="cs-CZ" dirty="0" smtClean="0">
+                <a:hlinkClick r:id="rId3"/>
+              </a:rPr>
+              <a:t>raw.githubusercontent.com/espressif/arduino-esp32/gh-pages/package_esp32_index.json</a:t>
+            </a:r>
+            <a:r>
+              <a:rPr lang="cs-CZ" dirty="0" smtClean="0"/>
+              <a:t> </a:t>
+            </a:r>
+            <a:endParaRPr lang="cs-CZ" dirty="0"/>
+          </a:p>
+          <a:p>
+            <a:r>
+              <a:rPr lang="cs-CZ" dirty="0" smtClean="0"/>
+              <a:t>Knihovny </a:t>
+            </a:r>
+            <a:r>
+              <a:rPr lang="cs-CZ" dirty="0" smtClean="0"/>
+              <a:t>které je potřeba nainstalovat:</a:t>
+            </a:r>
+          </a:p>
+          <a:p>
+            <a:pPr lvl="1"/>
+            <a:r>
+              <a:rPr lang="cs-CZ" dirty="0">
+                <a:hlinkClick r:id="rId4"/>
+              </a:rPr>
+              <a:t>https://</a:t>
+            </a:r>
+            <a:r>
+              <a:rPr lang="cs-CZ" dirty="0" smtClean="0">
+                <a:hlinkClick r:id="rId4"/>
+              </a:rPr>
+              <a:t>github.com/bertmelis/Ticker-esp32</a:t>
+            </a:r>
+            <a:r>
+              <a:rPr lang="cs-CZ" dirty="0" smtClean="0"/>
+              <a:t> (instalovat ze zipu)</a:t>
+            </a:r>
+          </a:p>
+          <a:p>
+            <a:pPr lvl="1"/>
+            <a:r>
+              <a:rPr lang="cs-CZ" dirty="0" smtClean="0">
+                <a:hlinkClick r:id="rId5"/>
+              </a:rPr>
+              <a:t>https</a:t>
+            </a:r>
+            <a:r>
+              <a:rPr lang="cs-CZ" dirty="0">
+                <a:hlinkClick r:id="rId5"/>
+              </a:rPr>
+              <a:t>://</a:t>
+            </a:r>
+            <a:r>
+              <a:rPr lang="cs-CZ" dirty="0" smtClean="0">
+                <a:hlinkClick r:id="rId5"/>
+              </a:rPr>
+              <a:t>github.com/jfturcot/SimpleTimer</a:t>
+            </a:r>
+            <a:r>
+              <a:rPr lang="cs-CZ" dirty="0" smtClean="0"/>
+              <a:t> </a:t>
+            </a:r>
+            <a:r>
+              <a:rPr lang="cs-CZ" dirty="0"/>
+              <a:t>(instalovat ze zipu</a:t>
+            </a:r>
+            <a:r>
+              <a:rPr lang="cs-CZ" dirty="0" smtClean="0"/>
+              <a:t>)</a:t>
+            </a:r>
+          </a:p>
+          <a:p>
+            <a:pPr lvl="1"/>
+            <a:r>
+              <a:rPr lang="cs-CZ" dirty="0">
+                <a:hlinkClick r:id="rId6"/>
+              </a:rPr>
+              <a:t>https://github.com/beegee-tokyo/DHTesp</a:t>
+            </a:r>
+            <a:r>
+              <a:rPr lang="cs-CZ" dirty="0"/>
+              <a:t> (manažer knihoven: </a:t>
+            </a:r>
+            <a:r>
+              <a:rPr lang="cs-CZ" b="1" dirty="0"/>
+              <a:t>DHT sensor </a:t>
+            </a:r>
+            <a:r>
+              <a:rPr lang="cs-CZ" b="1" dirty="0" err="1"/>
+              <a:t>library</a:t>
+            </a:r>
+            <a:r>
+              <a:rPr lang="cs-CZ" b="1" dirty="0"/>
+              <a:t> </a:t>
+            </a:r>
+            <a:r>
+              <a:rPr lang="cs-CZ" b="1" dirty="0" err="1"/>
+              <a:t>for</a:t>
+            </a:r>
+            <a:r>
+              <a:rPr lang="cs-CZ" b="1" dirty="0"/>
+              <a:t> </a:t>
+            </a:r>
+            <a:r>
+              <a:rPr lang="cs-CZ" b="1" dirty="0" err="1"/>
+              <a:t>ESPx</a:t>
+            </a:r>
+            <a:r>
+              <a:rPr lang="cs-CZ" dirty="0"/>
+              <a:t>)</a:t>
+            </a:r>
+          </a:p>
+          <a:p>
+            <a:pPr lvl="1"/>
+            <a:r>
+              <a:rPr lang="cs-CZ" b="1" dirty="0" smtClean="0"/>
+              <a:t>Blynk</a:t>
+            </a:r>
+            <a:r>
+              <a:rPr lang="cs-CZ" dirty="0" smtClean="0"/>
+              <a:t> </a:t>
+            </a:r>
+            <a:r>
+              <a:rPr lang="cs-CZ" dirty="0"/>
+              <a:t>(manažer knihoven: </a:t>
+            </a:r>
+            <a:r>
+              <a:rPr lang="cs-CZ" dirty="0" smtClean="0"/>
+              <a:t>Blynk</a:t>
+            </a:r>
+            <a:r>
+              <a:rPr lang="cs-CZ" dirty="0" smtClean="0"/>
+              <a:t>) – </a:t>
+            </a:r>
+            <a:r>
+              <a:rPr lang="cs-CZ" b="1" dirty="0" smtClean="0">
+                <a:solidFill>
+                  <a:srgbClr val="FF0000"/>
+                </a:solidFill>
+              </a:rPr>
+              <a:t>NEZAPOMENOUT NAINSTALOVAT</a:t>
+            </a:r>
+            <a:endParaRPr lang="cs-CZ" b="1" dirty="0">
+              <a:solidFill>
+                <a:srgbClr val="FF0000"/>
+              </a:solidFill>
+            </a:endParaRPr>
+          </a:p>
+          <a:p>
+            <a:pPr lvl="1"/>
+            <a:endParaRPr lang="cs-CZ" dirty="0" smtClean="0"/>
+          </a:p>
+          <a:p>
+            <a:pPr lvl="1"/>
+            <a:r>
+              <a:rPr lang="cs-CZ" dirty="0" err="1" smtClean="0"/>
+              <a:t>Sketch</a:t>
+            </a:r>
+            <a:r>
+              <a:rPr lang="cs-CZ" dirty="0" smtClean="0"/>
+              <a:t> si stáhněte z webové stránky:</a:t>
+            </a:r>
+          </a:p>
+          <a:p>
+            <a:pPr lvl="2"/>
+            <a:r>
+              <a:rPr lang="cs-CZ" dirty="0">
+                <a:hlinkClick r:id="rId7"/>
+              </a:rPr>
+              <a:t>https://</a:t>
+            </a:r>
+            <a:r>
+              <a:rPr lang="cs-CZ" dirty="0" smtClean="0">
+                <a:hlinkClick r:id="rId7"/>
+              </a:rPr>
+              <a:t>github.com/fablab-brno/Arduino-Akademie</a:t>
+            </a:r>
+            <a:r>
+              <a:rPr lang="cs-CZ" dirty="0" smtClean="0"/>
+              <a:t> -&gt; Workshop 4 -&gt; </a:t>
+            </a:r>
+            <a:r>
+              <a:rPr lang="cs-CZ" dirty="0" err="1" smtClean="0"/>
+              <a:t>Blynk_Workshop</a:t>
+            </a:r>
+            <a:endParaRPr lang="cs-CZ" dirty="0"/>
+          </a:p>
+          <a:p>
+            <a:pPr lvl="1"/>
+            <a:endParaRPr lang="cs-CZ" dirty="0"/>
+          </a:p>
+        </p:txBody>
+      </p:sp>
+      <p:sp>
+        <p:nvSpPr>
+          <p:cNvPr id="3" name="Obdélník 2"/>
+          <p:cNvSpPr/>
           <p:nvPr/>
-        </p:nvPicPr>
-        <p:blipFill>
-          <a:blip r:embed="rId3">
-            <a:extLst>
-              <a:ext uri="{28A0092B-C50C-407E-A947-70E740481C1C}">
-                <a14:useLocalDpi xmlns:a14="http://schemas.microsoft.com/office/drawing/2010/main" val="0"/>
-              </a:ext>
-            </a:extLst>
-          </a:blip>
-          <a:stretch>
-            <a:fillRect/>
-          </a:stretch>
-        </p:blipFill>
+        </p:nvSpPr>
         <p:spPr>
           <a:xfrm>
-            <a:off x="2172590" y="1804581"/>
-            <a:ext cx="8642152" cy="4062550"/>
-          </a:xfrm>
-          <a:prstGeom prst="rect">
-            <a:avLst/>
-          </a:prstGeom>
-        </p:spPr>
-      </p:pic>
-      <p:sp>
-        <p:nvSpPr>
-          <p:cNvPr id="7" name="Zástupný symbol pro obsah 1"/>
-          <p:cNvSpPr txBox="1">
-            <a:spLocks/>
-          </p:cNvSpPr>
-          <p:nvPr/>
-        </p:nvSpPr>
-        <p:spPr>
-          <a:xfrm>
-            <a:off x="6137598" y="1196676"/>
-            <a:ext cx="712135" cy="462306"/>
-          </a:xfrm>
-          <a:prstGeom prst="rect">
-            <a:avLst/>
-          </a:prstGeom>
-        </p:spPr>
-        <p:txBody>
-          <a:bodyPr vert="horz" lIns="91440" tIns="45720" rIns="91440" bIns="45720" rtlCol="0" anchor="ctr">
-            <a:normAutofit/>
-          </a:bodyPr>
-          <a:lstStyle>
-            <a:lvl1pPr marL="285750" indent="-285750" algn="l" defTabSz="457200" rtl="0" eaLnBrk="1" latinLnBrk="0" hangingPunct="1">
-              <a:spcBef>
-                <a:spcPct val="20000"/>
-              </a:spcBef>
-              <a:spcAft>
-                <a:spcPts val="600"/>
-              </a:spcAft>
-              <a:buClr>
-                <a:schemeClr val="accent1">
-                  <a:lumMod val="75000"/>
-                </a:schemeClr>
-              </a:buClr>
-              <a:buSzPct val="145000"/>
-              <a:buFont typeface="Arial"/>
-              <a:buChar char="•"/>
-              <a:defRPr sz="2400" kern="1200" cap="none">
-                <a:solidFill>
-                  <a:schemeClr val="tx1"/>
-                </a:solidFill>
-                <a:effectLst/>
-                <a:latin typeface="+mn-lt"/>
-                <a:ea typeface="+mn-ea"/>
-                <a:cs typeface="+mn-cs"/>
-              </a:defRPr>
-            </a:lvl1pPr>
-            <a:lvl2pPr marL="742950" indent="-285750" algn="l" defTabSz="457200" rtl="0" eaLnBrk="1" latinLnBrk="0" hangingPunct="1">
-              <a:spcBef>
-                <a:spcPct val="20000"/>
-              </a:spcBef>
-              <a:spcAft>
-                <a:spcPts val="600"/>
-              </a:spcAft>
-              <a:buClr>
-                <a:schemeClr val="accent1">
-                  <a:lumMod val="75000"/>
-                </a:schemeClr>
-              </a:buClr>
-              <a:buSzPct val="145000"/>
-              <a:buFont typeface="Arial"/>
-              <a:buChar char="•"/>
-              <a:defRPr sz="2000" kern="1200" cap="none">
-                <a:solidFill>
-                  <a:schemeClr val="tx1"/>
-                </a:solidFill>
-                <a:effectLst/>
-                <a:latin typeface="+mn-lt"/>
-                <a:ea typeface="+mn-ea"/>
-                <a:cs typeface="+mn-cs"/>
-              </a:defRPr>
-            </a:lvl2pPr>
-            <a:lvl3pPr marL="1200150" indent="-285750" algn="l" defTabSz="457200" rtl="0" eaLnBrk="1" latinLnBrk="0" hangingPunct="1">
-              <a:spcBef>
-                <a:spcPct val="20000"/>
-              </a:spcBef>
-              <a:spcAft>
-                <a:spcPts val="600"/>
-              </a:spcAft>
-              <a:buClr>
-                <a:schemeClr val="accent1">
-                  <a:lumMod val="75000"/>
-                </a:schemeClr>
-              </a:buClr>
-              <a:buSzPct val="145000"/>
-              <a:buFont typeface="Arial"/>
-              <a:buChar char="•"/>
-              <a:defRPr sz="1800" kern="1200" cap="none">
-                <a:solidFill>
-                  <a:schemeClr val="tx1"/>
-                </a:solidFill>
-                <a:effectLst/>
-                <a:latin typeface="+mn-lt"/>
-                <a:ea typeface="+mn-ea"/>
-                <a:cs typeface="+mn-cs"/>
-              </a:defRPr>
-            </a:lvl3pPr>
-            <a:lvl4pPr marL="1543050" indent="-171450" algn="l" defTabSz="457200" rtl="0" eaLnBrk="1" latinLnBrk="0" hangingPunct="1">
-              <a:spcBef>
-                <a:spcPct val="20000"/>
-              </a:spcBef>
-              <a:spcAft>
-                <a:spcPts val="600"/>
-              </a:spcAft>
-              <a:buClr>
-                <a:schemeClr val="accent1">
-                  <a:lumMod val="75000"/>
-                </a:schemeClr>
-              </a:buClr>
-              <a:buSzPct val="145000"/>
-              <a:buFont typeface="Arial"/>
-              <a:buChar char="•"/>
-              <a:defRPr sz="1600" kern="1200" cap="none">
-                <a:solidFill>
-                  <a:schemeClr val="tx1"/>
-                </a:solidFill>
-                <a:effectLst/>
-                <a:latin typeface="+mn-lt"/>
-                <a:ea typeface="+mn-ea"/>
-                <a:cs typeface="+mn-cs"/>
-              </a:defRPr>
-            </a:lvl4pPr>
-            <a:lvl5pPr marL="2000250" indent="-171450" algn="l" defTabSz="457200" rtl="0" eaLnBrk="1" latinLnBrk="0" hangingPunct="1">
-              <a:spcBef>
-                <a:spcPct val="20000"/>
-              </a:spcBef>
-              <a:spcAft>
-                <a:spcPts val="600"/>
-              </a:spcAft>
-              <a:buClr>
-                <a:schemeClr val="accent1">
-                  <a:lumMod val="75000"/>
-                </a:schemeClr>
-              </a:buClr>
-              <a:buSzPct val="145000"/>
-              <a:buFont typeface="Arial"/>
-              <a:buChar char="•"/>
-              <a:defRPr sz="1400" kern="1200" cap="none">
-                <a:solidFill>
-                  <a:schemeClr val="tx1"/>
-                </a:solidFill>
-                <a:effectLst/>
-                <a:latin typeface="+mn-lt"/>
-                <a:ea typeface="+mn-ea"/>
-                <a:cs typeface="+mn-cs"/>
-              </a:defRPr>
-            </a:lvl5pPr>
-            <a:lvl6pPr marL="2514600" indent="-228600" algn="l" defTabSz="457200" rtl="0" eaLnBrk="1" latinLnBrk="0" hangingPunct="1">
-              <a:spcBef>
-                <a:spcPct val="20000"/>
-              </a:spcBef>
-              <a:spcAft>
-                <a:spcPts val="600"/>
-              </a:spcAft>
-              <a:buClr>
-                <a:schemeClr val="accent1">
-                  <a:lumMod val="75000"/>
-                </a:schemeClr>
-              </a:buClr>
-              <a:buSzPct val="145000"/>
-              <a:buFont typeface="Arial"/>
-              <a:buChar char="•"/>
-              <a:defRPr sz="1400" kern="1200" cap="none">
-                <a:solidFill>
-                  <a:schemeClr val="tx1"/>
-                </a:solidFill>
-                <a:effectLst/>
-                <a:latin typeface="+mn-lt"/>
-                <a:ea typeface="+mn-ea"/>
-                <a:cs typeface="+mn-cs"/>
-              </a:defRPr>
-            </a:lvl6pPr>
-            <a:lvl7pPr marL="2971800" indent="-228600" algn="l" defTabSz="457200" rtl="0" eaLnBrk="1" latinLnBrk="0" hangingPunct="1">
-              <a:spcBef>
-                <a:spcPct val="20000"/>
-              </a:spcBef>
-              <a:spcAft>
-                <a:spcPts val="600"/>
-              </a:spcAft>
-              <a:buClr>
-                <a:schemeClr val="accent1">
-                  <a:lumMod val="75000"/>
-                </a:schemeClr>
-              </a:buClr>
-              <a:buSzPct val="145000"/>
-              <a:buFont typeface="Arial"/>
-              <a:buChar char="•"/>
-              <a:defRPr sz="1400" kern="1200" cap="none">
-                <a:solidFill>
-                  <a:schemeClr val="tx1"/>
-                </a:solidFill>
-                <a:effectLst/>
-                <a:latin typeface="+mn-lt"/>
-                <a:ea typeface="+mn-ea"/>
-                <a:cs typeface="+mn-cs"/>
-              </a:defRPr>
-            </a:lvl7pPr>
-            <a:lvl8pPr marL="3429000" indent="-228600" algn="l" defTabSz="457200" rtl="0" eaLnBrk="1" latinLnBrk="0" hangingPunct="1">
-              <a:spcBef>
-                <a:spcPct val="20000"/>
-              </a:spcBef>
-              <a:spcAft>
-                <a:spcPts val="600"/>
-              </a:spcAft>
-              <a:buClr>
-                <a:schemeClr val="accent1">
-                  <a:lumMod val="75000"/>
-                </a:schemeClr>
-              </a:buClr>
-              <a:buSzPct val="145000"/>
-              <a:buFont typeface="Arial"/>
-              <a:buChar char="•"/>
-              <a:defRPr sz="1400" kern="1200" cap="none">
-                <a:solidFill>
-                  <a:schemeClr val="tx1"/>
-                </a:solidFill>
-                <a:effectLst/>
-                <a:latin typeface="+mn-lt"/>
-                <a:ea typeface="+mn-ea"/>
-                <a:cs typeface="+mn-cs"/>
-              </a:defRPr>
-            </a:lvl8pPr>
-            <a:lvl9pPr marL="3886200" indent="-228600" algn="l" defTabSz="457200" rtl="0" eaLnBrk="1" latinLnBrk="0" hangingPunct="1">
-              <a:spcBef>
-                <a:spcPct val="20000"/>
-              </a:spcBef>
-              <a:spcAft>
-                <a:spcPts val="600"/>
-              </a:spcAft>
-              <a:buClr>
-                <a:schemeClr val="accent1">
-                  <a:lumMod val="75000"/>
-                </a:schemeClr>
-              </a:buClr>
-              <a:buSzPct val="145000"/>
-              <a:buFont typeface="Arial"/>
-              <a:buChar char="•"/>
-              <a:defRPr sz="1400" kern="1200" cap="none">
-                <a:solidFill>
-                  <a:schemeClr val="tx1"/>
-                </a:solidFill>
-                <a:effectLst/>
-                <a:latin typeface="+mn-lt"/>
-                <a:ea typeface="+mn-ea"/>
-                <a:cs typeface="+mn-cs"/>
-              </a:defRPr>
-            </a:lvl9pPr>
-          </a:lstStyle>
-          <a:p>
-            <a:pPr marL="0" indent="0">
-              <a:buFont typeface="Arial"/>
-              <a:buNone/>
-            </a:pPr>
-            <a:r>
-              <a:rPr lang="cs-CZ" sz="1600" dirty="0" smtClean="0"/>
-              <a:t>Pin 32</a:t>
-            </a:r>
-            <a:endParaRPr lang="cs-CZ" sz="1600" dirty="0"/>
-          </a:p>
-        </p:txBody>
-      </p:sp>
-      <p:sp>
-        <p:nvSpPr>
-          <p:cNvPr id="8" name="Zástupný symbol pro obsah 1"/>
-          <p:cNvSpPr txBox="1">
-            <a:spLocks/>
-          </p:cNvSpPr>
-          <p:nvPr/>
-        </p:nvSpPr>
-        <p:spPr>
-          <a:xfrm>
-            <a:off x="5425463" y="1196676"/>
-            <a:ext cx="712135" cy="462306"/>
-          </a:xfrm>
-          <a:prstGeom prst="rect">
-            <a:avLst/>
-          </a:prstGeom>
-        </p:spPr>
-        <p:txBody>
-          <a:bodyPr vert="horz" lIns="91440" tIns="45720" rIns="91440" bIns="45720" rtlCol="0" anchor="ctr">
-            <a:normAutofit/>
-          </a:bodyPr>
-          <a:lstStyle>
-            <a:lvl1pPr marL="285750" indent="-285750" algn="l" defTabSz="457200" rtl="0" eaLnBrk="1" latinLnBrk="0" hangingPunct="1">
-              <a:spcBef>
-                <a:spcPct val="20000"/>
-              </a:spcBef>
-              <a:spcAft>
-                <a:spcPts val="600"/>
-              </a:spcAft>
-              <a:buClr>
-                <a:schemeClr val="accent1">
-                  <a:lumMod val="75000"/>
-                </a:schemeClr>
-              </a:buClr>
-              <a:buSzPct val="145000"/>
-              <a:buFont typeface="Arial"/>
-              <a:buChar char="•"/>
-              <a:defRPr sz="2400" kern="1200" cap="none">
-                <a:solidFill>
-                  <a:schemeClr val="tx1"/>
-                </a:solidFill>
-                <a:effectLst/>
-                <a:latin typeface="+mn-lt"/>
-                <a:ea typeface="+mn-ea"/>
-                <a:cs typeface="+mn-cs"/>
-              </a:defRPr>
-            </a:lvl1pPr>
-            <a:lvl2pPr marL="742950" indent="-285750" algn="l" defTabSz="457200" rtl="0" eaLnBrk="1" latinLnBrk="0" hangingPunct="1">
-              <a:spcBef>
-                <a:spcPct val="20000"/>
-              </a:spcBef>
-              <a:spcAft>
-                <a:spcPts val="600"/>
-              </a:spcAft>
-              <a:buClr>
-                <a:schemeClr val="accent1">
-                  <a:lumMod val="75000"/>
-                </a:schemeClr>
-              </a:buClr>
-              <a:buSzPct val="145000"/>
-              <a:buFont typeface="Arial"/>
-              <a:buChar char="•"/>
-              <a:defRPr sz="2000" kern="1200" cap="none">
-                <a:solidFill>
-                  <a:schemeClr val="tx1"/>
-                </a:solidFill>
-                <a:effectLst/>
-                <a:latin typeface="+mn-lt"/>
-                <a:ea typeface="+mn-ea"/>
-                <a:cs typeface="+mn-cs"/>
-              </a:defRPr>
-            </a:lvl2pPr>
-            <a:lvl3pPr marL="1200150" indent="-285750" algn="l" defTabSz="457200" rtl="0" eaLnBrk="1" latinLnBrk="0" hangingPunct="1">
-              <a:spcBef>
-                <a:spcPct val="20000"/>
-              </a:spcBef>
-              <a:spcAft>
-                <a:spcPts val="600"/>
-              </a:spcAft>
-              <a:buClr>
-                <a:schemeClr val="accent1">
-                  <a:lumMod val="75000"/>
-                </a:schemeClr>
-              </a:buClr>
-              <a:buSzPct val="145000"/>
-              <a:buFont typeface="Arial"/>
-              <a:buChar char="•"/>
-              <a:defRPr sz="1800" kern="1200" cap="none">
-                <a:solidFill>
-                  <a:schemeClr val="tx1"/>
-                </a:solidFill>
-                <a:effectLst/>
-                <a:latin typeface="+mn-lt"/>
-                <a:ea typeface="+mn-ea"/>
-                <a:cs typeface="+mn-cs"/>
-              </a:defRPr>
-            </a:lvl3pPr>
-            <a:lvl4pPr marL="1543050" indent="-171450" algn="l" defTabSz="457200" rtl="0" eaLnBrk="1" latinLnBrk="0" hangingPunct="1">
-              <a:spcBef>
-                <a:spcPct val="20000"/>
-              </a:spcBef>
-              <a:spcAft>
-                <a:spcPts val="600"/>
-              </a:spcAft>
-              <a:buClr>
-                <a:schemeClr val="accent1">
-                  <a:lumMod val="75000"/>
-                </a:schemeClr>
-              </a:buClr>
-              <a:buSzPct val="145000"/>
-              <a:buFont typeface="Arial"/>
-              <a:buChar char="•"/>
-              <a:defRPr sz="1600" kern="1200" cap="none">
-                <a:solidFill>
-                  <a:schemeClr val="tx1"/>
-                </a:solidFill>
-                <a:effectLst/>
-                <a:latin typeface="+mn-lt"/>
-                <a:ea typeface="+mn-ea"/>
-                <a:cs typeface="+mn-cs"/>
-              </a:defRPr>
-            </a:lvl4pPr>
-            <a:lvl5pPr marL="2000250" indent="-171450" algn="l" defTabSz="457200" rtl="0" eaLnBrk="1" latinLnBrk="0" hangingPunct="1">
-              <a:spcBef>
-                <a:spcPct val="20000"/>
-              </a:spcBef>
-              <a:spcAft>
-                <a:spcPts val="600"/>
-              </a:spcAft>
-              <a:buClr>
-                <a:schemeClr val="accent1">
-                  <a:lumMod val="75000"/>
-                </a:schemeClr>
-              </a:buClr>
-              <a:buSzPct val="145000"/>
-              <a:buFont typeface="Arial"/>
-              <a:buChar char="•"/>
-              <a:defRPr sz="1400" kern="1200" cap="none">
-                <a:solidFill>
-                  <a:schemeClr val="tx1"/>
-                </a:solidFill>
-                <a:effectLst/>
-                <a:latin typeface="+mn-lt"/>
-                <a:ea typeface="+mn-ea"/>
-                <a:cs typeface="+mn-cs"/>
-              </a:defRPr>
-            </a:lvl5pPr>
-            <a:lvl6pPr marL="2514600" indent="-228600" algn="l" defTabSz="457200" rtl="0" eaLnBrk="1" latinLnBrk="0" hangingPunct="1">
-              <a:spcBef>
-                <a:spcPct val="20000"/>
-              </a:spcBef>
-              <a:spcAft>
-                <a:spcPts val="600"/>
-              </a:spcAft>
-              <a:buClr>
-                <a:schemeClr val="accent1">
-                  <a:lumMod val="75000"/>
-                </a:schemeClr>
-              </a:buClr>
-              <a:buSzPct val="145000"/>
-              <a:buFont typeface="Arial"/>
-              <a:buChar char="•"/>
-              <a:defRPr sz="1400" kern="1200" cap="none">
-                <a:solidFill>
-                  <a:schemeClr val="tx1"/>
-                </a:solidFill>
-                <a:effectLst/>
-                <a:latin typeface="+mn-lt"/>
-                <a:ea typeface="+mn-ea"/>
-                <a:cs typeface="+mn-cs"/>
-              </a:defRPr>
-            </a:lvl6pPr>
-            <a:lvl7pPr marL="2971800" indent="-228600" algn="l" defTabSz="457200" rtl="0" eaLnBrk="1" latinLnBrk="0" hangingPunct="1">
-              <a:spcBef>
-                <a:spcPct val="20000"/>
-              </a:spcBef>
-              <a:spcAft>
-                <a:spcPts val="600"/>
-              </a:spcAft>
-              <a:buClr>
-                <a:schemeClr val="accent1">
-                  <a:lumMod val="75000"/>
-                </a:schemeClr>
-              </a:buClr>
-              <a:buSzPct val="145000"/>
-              <a:buFont typeface="Arial"/>
-              <a:buChar char="•"/>
-              <a:defRPr sz="1400" kern="1200" cap="none">
-                <a:solidFill>
-                  <a:schemeClr val="tx1"/>
-                </a:solidFill>
-                <a:effectLst/>
-                <a:latin typeface="+mn-lt"/>
-                <a:ea typeface="+mn-ea"/>
-                <a:cs typeface="+mn-cs"/>
-              </a:defRPr>
-            </a:lvl7pPr>
-            <a:lvl8pPr marL="3429000" indent="-228600" algn="l" defTabSz="457200" rtl="0" eaLnBrk="1" latinLnBrk="0" hangingPunct="1">
-              <a:spcBef>
-                <a:spcPct val="20000"/>
-              </a:spcBef>
-              <a:spcAft>
-                <a:spcPts val="600"/>
-              </a:spcAft>
-              <a:buClr>
-                <a:schemeClr val="accent1">
-                  <a:lumMod val="75000"/>
-                </a:schemeClr>
-              </a:buClr>
-              <a:buSzPct val="145000"/>
-              <a:buFont typeface="Arial"/>
-              <a:buChar char="•"/>
-              <a:defRPr sz="1400" kern="1200" cap="none">
-                <a:solidFill>
-                  <a:schemeClr val="tx1"/>
-                </a:solidFill>
-                <a:effectLst/>
-                <a:latin typeface="+mn-lt"/>
-                <a:ea typeface="+mn-ea"/>
-                <a:cs typeface="+mn-cs"/>
-              </a:defRPr>
-            </a:lvl8pPr>
-            <a:lvl9pPr marL="3886200" indent="-228600" algn="l" defTabSz="457200" rtl="0" eaLnBrk="1" latinLnBrk="0" hangingPunct="1">
-              <a:spcBef>
-                <a:spcPct val="20000"/>
-              </a:spcBef>
-              <a:spcAft>
-                <a:spcPts val="600"/>
-              </a:spcAft>
-              <a:buClr>
-                <a:schemeClr val="accent1">
-                  <a:lumMod val="75000"/>
-                </a:schemeClr>
-              </a:buClr>
-              <a:buSzPct val="145000"/>
-              <a:buFont typeface="Arial"/>
-              <a:buChar char="•"/>
-              <a:defRPr sz="1400" kern="1200" cap="none">
-                <a:solidFill>
-                  <a:schemeClr val="tx1"/>
-                </a:solidFill>
-                <a:effectLst/>
-                <a:latin typeface="+mn-lt"/>
-                <a:ea typeface="+mn-ea"/>
-                <a:cs typeface="+mn-cs"/>
-              </a:defRPr>
-            </a:lvl9pPr>
-          </a:lstStyle>
-          <a:p>
-            <a:pPr marL="0" indent="0">
-              <a:buFont typeface="Arial"/>
-              <a:buNone/>
-            </a:pPr>
-            <a:r>
-              <a:rPr lang="cs-CZ" sz="1600" dirty="0" smtClean="0"/>
-              <a:t>Pin 12</a:t>
-            </a:r>
-            <a:endParaRPr lang="cs-CZ" sz="1600" dirty="0"/>
-          </a:p>
-        </p:txBody>
-      </p:sp>
-      <p:sp>
-        <p:nvSpPr>
-          <p:cNvPr id="9" name="Zástupný symbol pro obsah 1"/>
-          <p:cNvSpPr txBox="1">
-            <a:spLocks/>
-          </p:cNvSpPr>
-          <p:nvPr/>
-        </p:nvSpPr>
-        <p:spPr>
-          <a:xfrm>
-            <a:off x="4741608" y="1196676"/>
-            <a:ext cx="712135" cy="462306"/>
-          </a:xfrm>
-          <a:prstGeom prst="rect">
-            <a:avLst/>
-          </a:prstGeom>
-        </p:spPr>
-        <p:txBody>
-          <a:bodyPr vert="horz" lIns="91440" tIns="45720" rIns="91440" bIns="45720" rtlCol="0" anchor="ctr">
-            <a:normAutofit/>
-          </a:bodyPr>
-          <a:lstStyle>
-            <a:lvl1pPr marL="285750" indent="-285750" algn="l" defTabSz="457200" rtl="0" eaLnBrk="1" latinLnBrk="0" hangingPunct="1">
-              <a:spcBef>
-                <a:spcPct val="20000"/>
-              </a:spcBef>
-              <a:spcAft>
-                <a:spcPts val="600"/>
-              </a:spcAft>
-              <a:buClr>
-                <a:schemeClr val="accent1">
-                  <a:lumMod val="75000"/>
-                </a:schemeClr>
-              </a:buClr>
-              <a:buSzPct val="145000"/>
-              <a:buFont typeface="Arial"/>
-              <a:buChar char="•"/>
-              <a:defRPr sz="2400" kern="1200" cap="none">
-                <a:solidFill>
-                  <a:schemeClr val="tx1"/>
-                </a:solidFill>
-                <a:effectLst/>
-                <a:latin typeface="+mn-lt"/>
-                <a:ea typeface="+mn-ea"/>
-                <a:cs typeface="+mn-cs"/>
-              </a:defRPr>
-            </a:lvl1pPr>
-            <a:lvl2pPr marL="742950" indent="-285750" algn="l" defTabSz="457200" rtl="0" eaLnBrk="1" latinLnBrk="0" hangingPunct="1">
-              <a:spcBef>
-                <a:spcPct val="20000"/>
-              </a:spcBef>
-              <a:spcAft>
-                <a:spcPts val="600"/>
-              </a:spcAft>
-              <a:buClr>
-                <a:schemeClr val="accent1">
-                  <a:lumMod val="75000"/>
-                </a:schemeClr>
-              </a:buClr>
-              <a:buSzPct val="145000"/>
-              <a:buFont typeface="Arial"/>
-              <a:buChar char="•"/>
-              <a:defRPr sz="2000" kern="1200" cap="none">
-                <a:solidFill>
-                  <a:schemeClr val="tx1"/>
-                </a:solidFill>
-                <a:effectLst/>
-                <a:latin typeface="+mn-lt"/>
-                <a:ea typeface="+mn-ea"/>
-                <a:cs typeface="+mn-cs"/>
-              </a:defRPr>
-            </a:lvl2pPr>
-            <a:lvl3pPr marL="1200150" indent="-285750" algn="l" defTabSz="457200" rtl="0" eaLnBrk="1" latinLnBrk="0" hangingPunct="1">
-              <a:spcBef>
-                <a:spcPct val="20000"/>
-              </a:spcBef>
-              <a:spcAft>
-                <a:spcPts val="600"/>
-              </a:spcAft>
-              <a:buClr>
-                <a:schemeClr val="accent1">
-                  <a:lumMod val="75000"/>
-                </a:schemeClr>
-              </a:buClr>
-              <a:buSzPct val="145000"/>
-              <a:buFont typeface="Arial"/>
-              <a:buChar char="•"/>
-              <a:defRPr sz="1800" kern="1200" cap="none">
-                <a:solidFill>
-                  <a:schemeClr val="tx1"/>
-                </a:solidFill>
-                <a:effectLst/>
-                <a:latin typeface="+mn-lt"/>
-                <a:ea typeface="+mn-ea"/>
-                <a:cs typeface="+mn-cs"/>
-              </a:defRPr>
-            </a:lvl3pPr>
-            <a:lvl4pPr marL="1543050" indent="-171450" algn="l" defTabSz="457200" rtl="0" eaLnBrk="1" latinLnBrk="0" hangingPunct="1">
-              <a:spcBef>
-                <a:spcPct val="20000"/>
-              </a:spcBef>
-              <a:spcAft>
-                <a:spcPts val="600"/>
-              </a:spcAft>
-              <a:buClr>
-                <a:schemeClr val="accent1">
-                  <a:lumMod val="75000"/>
-                </a:schemeClr>
-              </a:buClr>
-              <a:buSzPct val="145000"/>
-              <a:buFont typeface="Arial"/>
-              <a:buChar char="•"/>
-              <a:defRPr sz="1600" kern="1200" cap="none">
-                <a:solidFill>
-                  <a:schemeClr val="tx1"/>
-                </a:solidFill>
-                <a:effectLst/>
-                <a:latin typeface="+mn-lt"/>
-                <a:ea typeface="+mn-ea"/>
-                <a:cs typeface="+mn-cs"/>
-              </a:defRPr>
-            </a:lvl4pPr>
-            <a:lvl5pPr marL="2000250" indent="-171450" algn="l" defTabSz="457200" rtl="0" eaLnBrk="1" latinLnBrk="0" hangingPunct="1">
-              <a:spcBef>
-                <a:spcPct val="20000"/>
-              </a:spcBef>
-              <a:spcAft>
-                <a:spcPts val="600"/>
-              </a:spcAft>
-              <a:buClr>
-                <a:schemeClr val="accent1">
-                  <a:lumMod val="75000"/>
-                </a:schemeClr>
-              </a:buClr>
-              <a:buSzPct val="145000"/>
-              <a:buFont typeface="Arial"/>
-              <a:buChar char="•"/>
-              <a:defRPr sz="1400" kern="1200" cap="none">
-                <a:solidFill>
-                  <a:schemeClr val="tx1"/>
-                </a:solidFill>
-                <a:effectLst/>
-                <a:latin typeface="+mn-lt"/>
-                <a:ea typeface="+mn-ea"/>
-                <a:cs typeface="+mn-cs"/>
-              </a:defRPr>
-            </a:lvl5pPr>
-            <a:lvl6pPr marL="2514600" indent="-228600" algn="l" defTabSz="457200" rtl="0" eaLnBrk="1" latinLnBrk="0" hangingPunct="1">
-              <a:spcBef>
-                <a:spcPct val="20000"/>
-              </a:spcBef>
-              <a:spcAft>
-                <a:spcPts val="600"/>
-              </a:spcAft>
-              <a:buClr>
-                <a:schemeClr val="accent1">
-                  <a:lumMod val="75000"/>
-                </a:schemeClr>
-              </a:buClr>
-              <a:buSzPct val="145000"/>
-              <a:buFont typeface="Arial"/>
-              <a:buChar char="•"/>
-              <a:defRPr sz="1400" kern="1200" cap="none">
-                <a:solidFill>
-                  <a:schemeClr val="tx1"/>
-                </a:solidFill>
-                <a:effectLst/>
-                <a:latin typeface="+mn-lt"/>
-                <a:ea typeface="+mn-ea"/>
-                <a:cs typeface="+mn-cs"/>
-              </a:defRPr>
-            </a:lvl6pPr>
-            <a:lvl7pPr marL="2971800" indent="-228600" algn="l" defTabSz="457200" rtl="0" eaLnBrk="1" latinLnBrk="0" hangingPunct="1">
-              <a:spcBef>
-                <a:spcPct val="20000"/>
-              </a:spcBef>
-              <a:spcAft>
-                <a:spcPts val="600"/>
-              </a:spcAft>
-              <a:buClr>
-                <a:schemeClr val="accent1">
-                  <a:lumMod val="75000"/>
-                </a:schemeClr>
-              </a:buClr>
-              <a:buSzPct val="145000"/>
-              <a:buFont typeface="Arial"/>
-              <a:buChar char="•"/>
-              <a:defRPr sz="1400" kern="1200" cap="none">
-                <a:solidFill>
-                  <a:schemeClr val="tx1"/>
-                </a:solidFill>
-                <a:effectLst/>
-                <a:latin typeface="+mn-lt"/>
-                <a:ea typeface="+mn-ea"/>
-                <a:cs typeface="+mn-cs"/>
-              </a:defRPr>
-            </a:lvl7pPr>
-            <a:lvl8pPr marL="3429000" indent="-228600" algn="l" defTabSz="457200" rtl="0" eaLnBrk="1" latinLnBrk="0" hangingPunct="1">
-              <a:spcBef>
-                <a:spcPct val="20000"/>
-              </a:spcBef>
-              <a:spcAft>
-                <a:spcPts val="600"/>
-              </a:spcAft>
-              <a:buClr>
-                <a:schemeClr val="accent1">
-                  <a:lumMod val="75000"/>
-                </a:schemeClr>
-              </a:buClr>
-              <a:buSzPct val="145000"/>
-              <a:buFont typeface="Arial"/>
-              <a:buChar char="•"/>
-              <a:defRPr sz="1400" kern="1200" cap="none">
-                <a:solidFill>
-                  <a:schemeClr val="tx1"/>
-                </a:solidFill>
-                <a:effectLst/>
-                <a:latin typeface="+mn-lt"/>
-                <a:ea typeface="+mn-ea"/>
-                <a:cs typeface="+mn-cs"/>
-              </a:defRPr>
-            </a:lvl8pPr>
-            <a:lvl9pPr marL="3886200" indent="-228600" algn="l" defTabSz="457200" rtl="0" eaLnBrk="1" latinLnBrk="0" hangingPunct="1">
-              <a:spcBef>
-                <a:spcPct val="20000"/>
-              </a:spcBef>
-              <a:spcAft>
-                <a:spcPts val="600"/>
-              </a:spcAft>
-              <a:buClr>
-                <a:schemeClr val="accent1">
-                  <a:lumMod val="75000"/>
-                </a:schemeClr>
-              </a:buClr>
-              <a:buSzPct val="145000"/>
-              <a:buFont typeface="Arial"/>
-              <a:buChar char="•"/>
-              <a:defRPr sz="1400" kern="1200" cap="none">
-                <a:solidFill>
-                  <a:schemeClr val="tx1"/>
-                </a:solidFill>
-                <a:effectLst/>
-                <a:latin typeface="+mn-lt"/>
-                <a:ea typeface="+mn-ea"/>
-                <a:cs typeface="+mn-cs"/>
-              </a:defRPr>
-            </a:lvl9pPr>
-          </a:lstStyle>
-          <a:p>
-            <a:pPr marL="0" indent="0">
-              <a:buFont typeface="Arial"/>
-              <a:buNone/>
-            </a:pPr>
-            <a:r>
-              <a:rPr lang="cs-CZ" sz="1600" dirty="0" smtClean="0"/>
-              <a:t>Pin 27</a:t>
-            </a:r>
-            <a:endParaRPr lang="cs-CZ" sz="1600" dirty="0"/>
-          </a:p>
-        </p:txBody>
-      </p:sp>
-      <p:sp>
-        <p:nvSpPr>
-          <p:cNvPr id="5" name="Obdélník 4"/>
-          <p:cNvSpPr/>
-          <p:nvPr/>
-        </p:nvSpPr>
-        <p:spPr>
-          <a:xfrm>
-            <a:off x="6137598" y="1246287"/>
-            <a:ext cx="712135" cy="363084"/>
+            <a:off x="4091528" y="2136348"/>
+            <a:ext cx="1035303" cy="437169"/>
           </a:xfrm>
           <a:prstGeom prst="rect">
             <a:avLst/>
@@ -13794,148 +13183,10 @@
           </a:p>
         </p:txBody>
       </p:sp>
-      <p:sp>
-        <p:nvSpPr>
-          <p:cNvPr id="10" name="Obdélník 9"/>
-          <p:cNvSpPr/>
-          <p:nvPr/>
-        </p:nvSpPr>
-        <p:spPr>
-          <a:xfrm>
-            <a:off x="7875682" y="6000549"/>
-            <a:ext cx="712135" cy="462306"/>
-          </a:xfrm>
-          <a:prstGeom prst="rect">
-            <a:avLst/>
-          </a:prstGeom>
-          <a:noFill/>
-          <a:ln w="38100">
-            <a:solidFill>
-              <a:srgbClr val="FF0000"/>
-            </a:solidFill>
-          </a:ln>
-        </p:spPr>
-        <p:style>
-          <a:lnRef idx="2">
-            <a:schemeClr val="accent1">
-              <a:shade val="50000"/>
-            </a:schemeClr>
-          </a:lnRef>
-          <a:fillRef idx="1">
-            <a:schemeClr val="accent1"/>
-          </a:fillRef>
-          <a:effectRef idx="0">
-            <a:schemeClr val="accent1"/>
-          </a:effectRef>
-          <a:fontRef idx="minor">
-            <a:schemeClr val="lt1"/>
-          </a:fontRef>
-        </p:style>
-        <p:txBody>
-          <a:bodyPr rtlCol="0" anchor="ctr"/>
-          <a:lstStyle/>
-          <a:p>
-            <a:pPr algn="ctr"/>
-            <a:endParaRPr lang="cs-CZ"/>
-          </a:p>
-        </p:txBody>
-      </p:sp>
-      <p:sp>
-        <p:nvSpPr>
-          <p:cNvPr id="11" name="Obdélník 10"/>
-          <p:cNvSpPr/>
-          <p:nvPr/>
-        </p:nvSpPr>
-        <p:spPr>
-          <a:xfrm>
-            <a:off x="5425462" y="1246287"/>
-            <a:ext cx="712135" cy="363084"/>
-          </a:xfrm>
-          <a:prstGeom prst="rect">
-            <a:avLst/>
-          </a:prstGeom>
-          <a:noFill/>
-          <a:ln w="38100">
-            <a:solidFill>
-              <a:srgbClr val="FF0000"/>
-            </a:solidFill>
-          </a:ln>
-        </p:spPr>
-        <p:style>
-          <a:lnRef idx="2">
-            <a:schemeClr val="accent1">
-              <a:shade val="50000"/>
-            </a:schemeClr>
-          </a:lnRef>
-          <a:fillRef idx="1">
-            <a:schemeClr val="accent1"/>
-          </a:fillRef>
-          <a:effectRef idx="0">
-            <a:schemeClr val="accent1"/>
-          </a:effectRef>
-          <a:fontRef idx="minor">
-            <a:schemeClr val="lt1"/>
-          </a:fontRef>
-        </p:style>
-        <p:txBody>
-          <a:bodyPr rtlCol="0" anchor="ctr"/>
-          <a:lstStyle/>
-          <a:p>
-            <a:pPr algn="ctr"/>
-            <a:endParaRPr lang="cs-CZ"/>
-          </a:p>
-        </p:txBody>
-      </p:sp>
-      <p:sp>
-        <p:nvSpPr>
-          <p:cNvPr id="12" name="Obdélník 11"/>
-          <p:cNvSpPr/>
-          <p:nvPr/>
-        </p:nvSpPr>
-        <p:spPr>
-          <a:xfrm>
-            <a:off x="4704593" y="1246287"/>
-            <a:ext cx="712135" cy="363084"/>
-          </a:xfrm>
-          <a:prstGeom prst="rect">
-            <a:avLst/>
-          </a:prstGeom>
-          <a:noFill/>
-          <a:ln w="38100">
-            <a:solidFill>
-              <a:srgbClr val="FF0000"/>
-            </a:solidFill>
-          </a:ln>
-        </p:spPr>
-        <p:style>
-          <a:lnRef idx="2">
-            <a:schemeClr val="accent1">
-              <a:shade val="50000"/>
-            </a:schemeClr>
-          </a:lnRef>
-          <a:fillRef idx="1">
-            <a:schemeClr val="accent1"/>
-          </a:fillRef>
-          <a:effectRef idx="0">
-            <a:schemeClr val="accent1"/>
-          </a:effectRef>
-          <a:fontRef idx="minor">
-            <a:schemeClr val="lt1"/>
-          </a:fontRef>
-        </p:style>
-        <p:txBody>
-          <a:bodyPr rtlCol="0" anchor="ctr"/>
-          <a:lstStyle/>
-          <a:p>
-            <a:pPr algn="ctr"/>
-            <a:endParaRPr lang="cs-CZ"/>
-          </a:p>
-        </p:txBody>
-      </p:sp>
     </p:spTree>
     <p:extLst>
       <p:ext uri="{BB962C8B-B14F-4D97-AF65-F5344CB8AC3E}">
-        <p14:creationId xmlns:p14="http://schemas.microsoft.com/office/powerpoint/2010/main" val="1620030877"/>
+        <p14:creationId xmlns:p14="http://schemas.microsoft.com/office/powerpoint/2010/main" val="2944603715"/>
       </p:ext>
     </p:extLst>
   </p:cSld>
@@ -14093,20 +13344,8 @@
           </a:lstStyle>
           <a:p>
             <a:r>
-              <a:rPr lang="cs-CZ" dirty="0" err="1" smtClean="0"/>
-              <a:t>Arduino</a:t>
-            </a:r>
-            <a:r>
               <a:rPr lang="cs-CZ" dirty="0" smtClean="0"/>
-              <a:t> IDE - </a:t>
-            </a:r>
-            <a:r>
-              <a:rPr lang="cs-CZ" dirty="0" err="1" smtClean="0"/>
-              <a:t>sketch</a:t>
-            </a:r>
-            <a:r>
-              <a:rPr lang="cs-CZ" dirty="0" smtClean="0"/>
-              <a:t> </a:t>
+              <a:t>Zapojení součástek</a:t>
             </a:r>
             <a:endParaRPr lang="cs-CZ" dirty="0"/>
           </a:p>
@@ -14124,8 +13363,8 @@
         </p:nvSpPr>
         <p:spPr>
           <a:xfrm>
-            <a:off x="1484310" y="715651"/>
-            <a:ext cx="10018713" cy="5666295"/>
+            <a:off x="7875683" y="6001103"/>
+            <a:ext cx="712135" cy="462306"/>
           </a:xfrm>
         </p:spPr>
         <p:txBody>
@@ -14134,179 +13373,840 @@
           </a:bodyPr>
           <a:lstStyle/>
           <a:p>
-            <a:r>
-              <a:rPr lang="cs-CZ" dirty="0" smtClean="0"/>
-              <a:t>Knihovny které je potřeba nainstalovat:</a:t>
-            </a:r>
-          </a:p>
-          <a:p>
-            <a:pPr lvl="1"/>
-            <a:r>
-              <a:rPr lang="cs-CZ" dirty="0">
-                <a:hlinkClick r:id="rId3"/>
-              </a:rPr>
-              <a:t>https://</a:t>
-            </a:r>
-            <a:r>
-              <a:rPr lang="cs-CZ" dirty="0" smtClean="0">
-                <a:hlinkClick r:id="rId3"/>
-              </a:rPr>
-              <a:t>github.com/bertmelis/Ticker-esp32</a:t>
-            </a:r>
-            <a:r>
-              <a:rPr lang="cs-CZ" dirty="0" smtClean="0"/>
-              <a:t> (instalovat ze zipu)</a:t>
-            </a:r>
-          </a:p>
-          <a:p>
-            <a:pPr lvl="1"/>
-            <a:r>
-              <a:rPr lang="cs-CZ" dirty="0" smtClean="0">
-                <a:hlinkClick r:id="rId4"/>
-              </a:rPr>
-              <a:t>https</a:t>
-            </a:r>
-            <a:r>
-              <a:rPr lang="cs-CZ" dirty="0">
-                <a:hlinkClick r:id="rId4"/>
-              </a:rPr>
-              <a:t>://</a:t>
-            </a:r>
-            <a:r>
-              <a:rPr lang="cs-CZ" dirty="0" smtClean="0">
-                <a:hlinkClick r:id="rId4"/>
-              </a:rPr>
-              <a:t>github.com/jfturcot/SimpleTimer</a:t>
-            </a:r>
-            <a:r>
-              <a:rPr lang="cs-CZ" dirty="0" smtClean="0"/>
-              <a:t> </a:t>
-            </a:r>
-            <a:r>
-              <a:rPr lang="cs-CZ" dirty="0"/>
-              <a:t>(instalovat ze zipu</a:t>
-            </a:r>
-            <a:r>
-              <a:rPr lang="cs-CZ" dirty="0" smtClean="0"/>
-              <a:t>)</a:t>
-            </a:r>
-          </a:p>
-          <a:p>
-            <a:pPr lvl="1"/>
-            <a:r>
-              <a:rPr lang="cs-CZ" dirty="0">
-                <a:hlinkClick r:id="rId5"/>
-              </a:rPr>
-              <a:t>https://github.com/beegee-tokyo/DHTesp</a:t>
-            </a:r>
-            <a:r>
-              <a:rPr lang="cs-CZ" dirty="0"/>
-              <a:t> (manažer knihoven: DHT sensor </a:t>
-            </a:r>
-            <a:r>
-              <a:rPr lang="cs-CZ" dirty="0" err="1"/>
-              <a:t>library</a:t>
-            </a:r>
-            <a:r>
-              <a:rPr lang="cs-CZ" dirty="0"/>
-              <a:t> </a:t>
-            </a:r>
-            <a:r>
-              <a:rPr lang="cs-CZ" dirty="0" err="1"/>
-              <a:t>for</a:t>
-            </a:r>
-            <a:r>
-              <a:rPr lang="cs-CZ" dirty="0"/>
-              <a:t> </a:t>
-            </a:r>
-            <a:r>
-              <a:rPr lang="cs-CZ" dirty="0" err="1"/>
-              <a:t>ESPx</a:t>
-            </a:r>
-            <a:r>
-              <a:rPr lang="cs-CZ" dirty="0"/>
-              <a:t>)</a:t>
-            </a:r>
-          </a:p>
-          <a:p>
-            <a:pPr lvl="1"/>
-            <a:r>
-              <a:rPr lang="cs-CZ" dirty="0" err="1" smtClean="0"/>
-              <a:t>Blynk</a:t>
-            </a:r>
-            <a:r>
-              <a:rPr lang="cs-CZ" dirty="0" smtClean="0"/>
-              <a:t> </a:t>
-            </a:r>
-            <a:r>
-              <a:rPr lang="cs-CZ" dirty="0"/>
-              <a:t>(manažer knihoven: </a:t>
-            </a:r>
-            <a:r>
-              <a:rPr lang="cs-CZ" dirty="0" err="1" smtClean="0"/>
-              <a:t>Blynk</a:t>
-            </a:r>
-            <a:r>
-              <a:rPr lang="cs-CZ" dirty="0" smtClean="0"/>
-              <a:t>)</a:t>
-            </a:r>
-            <a:endParaRPr lang="cs-CZ" dirty="0"/>
-          </a:p>
-          <a:p>
-            <a:pPr lvl="1"/>
-            <a:endParaRPr lang="cs-CZ" dirty="0" smtClean="0"/>
-          </a:p>
-          <a:p>
-            <a:pPr lvl="1"/>
-            <a:r>
-              <a:rPr lang="cs-CZ" dirty="0" err="1" smtClean="0"/>
-              <a:t>Sketch</a:t>
-            </a:r>
-            <a:r>
-              <a:rPr lang="cs-CZ" dirty="0" smtClean="0"/>
-              <a:t> si stáhněte z webové stránky:</a:t>
-            </a:r>
-          </a:p>
-          <a:p>
-            <a:pPr lvl="2"/>
-            <a:r>
-              <a:rPr lang="cs-CZ" dirty="0">
-                <a:hlinkClick r:id="rId6"/>
-              </a:rPr>
-              <a:t>https://</a:t>
-            </a:r>
-            <a:r>
-              <a:rPr lang="cs-CZ" dirty="0" smtClean="0">
-                <a:hlinkClick r:id="rId6"/>
-              </a:rPr>
-              <a:t>github.com/fablab-brno/Arduino-Akademie</a:t>
-            </a:r>
-            <a:r>
-              <a:rPr lang="cs-CZ" dirty="0" smtClean="0"/>
-              <a:t> -&gt; Workshop 4 -&gt; </a:t>
-            </a:r>
-            <a:r>
-              <a:rPr lang="cs-CZ" dirty="0" err="1" smtClean="0"/>
-              <a:t>Blynk_Workshop</a:t>
-            </a:r>
-            <a:endParaRPr lang="cs-CZ" dirty="0"/>
-          </a:p>
-          <a:p>
-            <a:pPr lvl="1"/>
-            <a:endParaRPr lang="cs-CZ" dirty="0"/>
-          </a:p>
-        </p:txBody>
-      </p:sp>
-      <p:sp>
-        <p:nvSpPr>
-          <p:cNvPr id="3" name="Obdélník 2"/>
+            <a:pPr marL="0" indent="0">
+              <a:buNone/>
+            </a:pPr>
+            <a:r>
+              <a:rPr lang="cs-CZ" sz="1600" dirty="0" smtClean="0"/>
+              <a:t>Pin 14</a:t>
+            </a:r>
+            <a:endParaRPr lang="cs-CZ" sz="1600" dirty="0"/>
+          </a:p>
+        </p:txBody>
+      </p:sp>
+      <p:pic>
+        <p:nvPicPr>
+          <p:cNvPr id="3" name="Obrázek 2"/>
+          <p:cNvPicPr>
+            <a:picLocks noChangeAspect="1"/>
+          </p:cNvPicPr>
+          <p:nvPr/>
+        </p:nvPicPr>
+        <p:blipFill>
+          <a:blip r:embed="rId3">
+            <a:extLst>
+              <a:ext uri="{28A0092B-C50C-407E-A947-70E740481C1C}">
+                <a14:useLocalDpi xmlns:a14="http://schemas.microsoft.com/office/drawing/2010/main" val="0"/>
+              </a:ext>
+            </a:extLst>
+          </a:blip>
+          <a:stretch>
+            <a:fillRect/>
+          </a:stretch>
+        </p:blipFill>
+        <p:spPr>
+          <a:xfrm>
+            <a:off x="2172590" y="1804581"/>
+            <a:ext cx="8642152" cy="4062550"/>
+          </a:xfrm>
+          <a:prstGeom prst="rect">
+            <a:avLst/>
+          </a:prstGeom>
+        </p:spPr>
+      </p:pic>
+      <p:sp>
+        <p:nvSpPr>
+          <p:cNvPr id="7" name="Zástupný symbol pro obsah 1"/>
+          <p:cNvSpPr txBox="1">
+            <a:spLocks/>
+          </p:cNvSpPr>
+          <p:nvPr/>
+        </p:nvSpPr>
+        <p:spPr>
+          <a:xfrm>
+            <a:off x="6137598" y="1196676"/>
+            <a:ext cx="712135" cy="462306"/>
+          </a:xfrm>
+          <a:prstGeom prst="rect">
+            <a:avLst/>
+          </a:prstGeom>
+        </p:spPr>
+        <p:txBody>
+          <a:bodyPr vert="horz" lIns="91440" tIns="45720" rIns="91440" bIns="45720" rtlCol="0" anchor="ctr">
+            <a:normAutofit/>
+          </a:bodyPr>
+          <a:lstStyle>
+            <a:lvl1pPr marL="285750" indent="-285750" algn="l" defTabSz="457200" rtl="0" eaLnBrk="1" latinLnBrk="0" hangingPunct="1">
+              <a:spcBef>
+                <a:spcPct val="20000"/>
+              </a:spcBef>
+              <a:spcAft>
+                <a:spcPts val="600"/>
+              </a:spcAft>
+              <a:buClr>
+                <a:schemeClr val="accent1">
+                  <a:lumMod val="75000"/>
+                </a:schemeClr>
+              </a:buClr>
+              <a:buSzPct val="145000"/>
+              <a:buFont typeface="Arial"/>
+              <a:buChar char="•"/>
+              <a:defRPr sz="2400" kern="1200" cap="none">
+                <a:solidFill>
+                  <a:schemeClr val="tx1"/>
+                </a:solidFill>
+                <a:effectLst/>
+                <a:latin typeface="+mn-lt"/>
+                <a:ea typeface="+mn-ea"/>
+                <a:cs typeface="+mn-cs"/>
+              </a:defRPr>
+            </a:lvl1pPr>
+            <a:lvl2pPr marL="742950" indent="-285750" algn="l" defTabSz="457200" rtl="0" eaLnBrk="1" latinLnBrk="0" hangingPunct="1">
+              <a:spcBef>
+                <a:spcPct val="20000"/>
+              </a:spcBef>
+              <a:spcAft>
+                <a:spcPts val="600"/>
+              </a:spcAft>
+              <a:buClr>
+                <a:schemeClr val="accent1">
+                  <a:lumMod val="75000"/>
+                </a:schemeClr>
+              </a:buClr>
+              <a:buSzPct val="145000"/>
+              <a:buFont typeface="Arial"/>
+              <a:buChar char="•"/>
+              <a:defRPr sz="2000" kern="1200" cap="none">
+                <a:solidFill>
+                  <a:schemeClr val="tx1"/>
+                </a:solidFill>
+                <a:effectLst/>
+                <a:latin typeface="+mn-lt"/>
+                <a:ea typeface="+mn-ea"/>
+                <a:cs typeface="+mn-cs"/>
+              </a:defRPr>
+            </a:lvl2pPr>
+            <a:lvl3pPr marL="1200150" indent="-285750" algn="l" defTabSz="457200" rtl="0" eaLnBrk="1" latinLnBrk="0" hangingPunct="1">
+              <a:spcBef>
+                <a:spcPct val="20000"/>
+              </a:spcBef>
+              <a:spcAft>
+                <a:spcPts val="600"/>
+              </a:spcAft>
+              <a:buClr>
+                <a:schemeClr val="accent1">
+                  <a:lumMod val="75000"/>
+                </a:schemeClr>
+              </a:buClr>
+              <a:buSzPct val="145000"/>
+              <a:buFont typeface="Arial"/>
+              <a:buChar char="•"/>
+              <a:defRPr sz="1800" kern="1200" cap="none">
+                <a:solidFill>
+                  <a:schemeClr val="tx1"/>
+                </a:solidFill>
+                <a:effectLst/>
+                <a:latin typeface="+mn-lt"/>
+                <a:ea typeface="+mn-ea"/>
+                <a:cs typeface="+mn-cs"/>
+              </a:defRPr>
+            </a:lvl3pPr>
+            <a:lvl4pPr marL="1543050" indent="-171450" algn="l" defTabSz="457200" rtl="0" eaLnBrk="1" latinLnBrk="0" hangingPunct="1">
+              <a:spcBef>
+                <a:spcPct val="20000"/>
+              </a:spcBef>
+              <a:spcAft>
+                <a:spcPts val="600"/>
+              </a:spcAft>
+              <a:buClr>
+                <a:schemeClr val="accent1">
+                  <a:lumMod val="75000"/>
+                </a:schemeClr>
+              </a:buClr>
+              <a:buSzPct val="145000"/>
+              <a:buFont typeface="Arial"/>
+              <a:buChar char="•"/>
+              <a:defRPr sz="1600" kern="1200" cap="none">
+                <a:solidFill>
+                  <a:schemeClr val="tx1"/>
+                </a:solidFill>
+                <a:effectLst/>
+                <a:latin typeface="+mn-lt"/>
+                <a:ea typeface="+mn-ea"/>
+                <a:cs typeface="+mn-cs"/>
+              </a:defRPr>
+            </a:lvl4pPr>
+            <a:lvl5pPr marL="2000250" indent="-171450" algn="l" defTabSz="457200" rtl="0" eaLnBrk="1" latinLnBrk="0" hangingPunct="1">
+              <a:spcBef>
+                <a:spcPct val="20000"/>
+              </a:spcBef>
+              <a:spcAft>
+                <a:spcPts val="600"/>
+              </a:spcAft>
+              <a:buClr>
+                <a:schemeClr val="accent1">
+                  <a:lumMod val="75000"/>
+                </a:schemeClr>
+              </a:buClr>
+              <a:buSzPct val="145000"/>
+              <a:buFont typeface="Arial"/>
+              <a:buChar char="•"/>
+              <a:defRPr sz="1400" kern="1200" cap="none">
+                <a:solidFill>
+                  <a:schemeClr val="tx1"/>
+                </a:solidFill>
+                <a:effectLst/>
+                <a:latin typeface="+mn-lt"/>
+                <a:ea typeface="+mn-ea"/>
+                <a:cs typeface="+mn-cs"/>
+              </a:defRPr>
+            </a:lvl5pPr>
+            <a:lvl6pPr marL="2514600" indent="-228600" algn="l" defTabSz="457200" rtl="0" eaLnBrk="1" latinLnBrk="0" hangingPunct="1">
+              <a:spcBef>
+                <a:spcPct val="20000"/>
+              </a:spcBef>
+              <a:spcAft>
+                <a:spcPts val="600"/>
+              </a:spcAft>
+              <a:buClr>
+                <a:schemeClr val="accent1">
+                  <a:lumMod val="75000"/>
+                </a:schemeClr>
+              </a:buClr>
+              <a:buSzPct val="145000"/>
+              <a:buFont typeface="Arial"/>
+              <a:buChar char="•"/>
+              <a:defRPr sz="1400" kern="1200" cap="none">
+                <a:solidFill>
+                  <a:schemeClr val="tx1"/>
+                </a:solidFill>
+                <a:effectLst/>
+                <a:latin typeface="+mn-lt"/>
+                <a:ea typeface="+mn-ea"/>
+                <a:cs typeface="+mn-cs"/>
+              </a:defRPr>
+            </a:lvl6pPr>
+            <a:lvl7pPr marL="2971800" indent="-228600" algn="l" defTabSz="457200" rtl="0" eaLnBrk="1" latinLnBrk="0" hangingPunct="1">
+              <a:spcBef>
+                <a:spcPct val="20000"/>
+              </a:spcBef>
+              <a:spcAft>
+                <a:spcPts val="600"/>
+              </a:spcAft>
+              <a:buClr>
+                <a:schemeClr val="accent1">
+                  <a:lumMod val="75000"/>
+                </a:schemeClr>
+              </a:buClr>
+              <a:buSzPct val="145000"/>
+              <a:buFont typeface="Arial"/>
+              <a:buChar char="•"/>
+              <a:defRPr sz="1400" kern="1200" cap="none">
+                <a:solidFill>
+                  <a:schemeClr val="tx1"/>
+                </a:solidFill>
+                <a:effectLst/>
+                <a:latin typeface="+mn-lt"/>
+                <a:ea typeface="+mn-ea"/>
+                <a:cs typeface="+mn-cs"/>
+              </a:defRPr>
+            </a:lvl7pPr>
+            <a:lvl8pPr marL="3429000" indent="-228600" algn="l" defTabSz="457200" rtl="0" eaLnBrk="1" latinLnBrk="0" hangingPunct="1">
+              <a:spcBef>
+                <a:spcPct val="20000"/>
+              </a:spcBef>
+              <a:spcAft>
+                <a:spcPts val="600"/>
+              </a:spcAft>
+              <a:buClr>
+                <a:schemeClr val="accent1">
+                  <a:lumMod val="75000"/>
+                </a:schemeClr>
+              </a:buClr>
+              <a:buSzPct val="145000"/>
+              <a:buFont typeface="Arial"/>
+              <a:buChar char="•"/>
+              <a:defRPr sz="1400" kern="1200" cap="none">
+                <a:solidFill>
+                  <a:schemeClr val="tx1"/>
+                </a:solidFill>
+                <a:effectLst/>
+                <a:latin typeface="+mn-lt"/>
+                <a:ea typeface="+mn-ea"/>
+                <a:cs typeface="+mn-cs"/>
+              </a:defRPr>
+            </a:lvl8pPr>
+            <a:lvl9pPr marL="3886200" indent="-228600" algn="l" defTabSz="457200" rtl="0" eaLnBrk="1" latinLnBrk="0" hangingPunct="1">
+              <a:spcBef>
+                <a:spcPct val="20000"/>
+              </a:spcBef>
+              <a:spcAft>
+                <a:spcPts val="600"/>
+              </a:spcAft>
+              <a:buClr>
+                <a:schemeClr val="accent1">
+                  <a:lumMod val="75000"/>
+                </a:schemeClr>
+              </a:buClr>
+              <a:buSzPct val="145000"/>
+              <a:buFont typeface="Arial"/>
+              <a:buChar char="•"/>
+              <a:defRPr sz="1400" kern="1200" cap="none">
+                <a:solidFill>
+                  <a:schemeClr val="tx1"/>
+                </a:solidFill>
+                <a:effectLst/>
+                <a:latin typeface="+mn-lt"/>
+                <a:ea typeface="+mn-ea"/>
+                <a:cs typeface="+mn-cs"/>
+              </a:defRPr>
+            </a:lvl9pPr>
+          </a:lstStyle>
+          <a:p>
+            <a:pPr marL="0" indent="0">
+              <a:buFont typeface="Arial"/>
+              <a:buNone/>
+            </a:pPr>
+            <a:r>
+              <a:rPr lang="cs-CZ" sz="1600" dirty="0" smtClean="0"/>
+              <a:t>Pin 32</a:t>
+            </a:r>
+            <a:endParaRPr lang="cs-CZ" sz="1600" dirty="0"/>
+          </a:p>
+        </p:txBody>
+      </p:sp>
+      <p:sp>
+        <p:nvSpPr>
+          <p:cNvPr id="8" name="Zástupný symbol pro obsah 1"/>
+          <p:cNvSpPr txBox="1">
+            <a:spLocks/>
+          </p:cNvSpPr>
+          <p:nvPr/>
+        </p:nvSpPr>
+        <p:spPr>
+          <a:xfrm>
+            <a:off x="5425463" y="1196676"/>
+            <a:ext cx="712135" cy="462306"/>
+          </a:xfrm>
+          <a:prstGeom prst="rect">
+            <a:avLst/>
+          </a:prstGeom>
+        </p:spPr>
+        <p:txBody>
+          <a:bodyPr vert="horz" lIns="91440" tIns="45720" rIns="91440" bIns="45720" rtlCol="0" anchor="ctr">
+            <a:normAutofit/>
+          </a:bodyPr>
+          <a:lstStyle>
+            <a:lvl1pPr marL="285750" indent="-285750" algn="l" defTabSz="457200" rtl="0" eaLnBrk="1" latinLnBrk="0" hangingPunct="1">
+              <a:spcBef>
+                <a:spcPct val="20000"/>
+              </a:spcBef>
+              <a:spcAft>
+                <a:spcPts val="600"/>
+              </a:spcAft>
+              <a:buClr>
+                <a:schemeClr val="accent1">
+                  <a:lumMod val="75000"/>
+                </a:schemeClr>
+              </a:buClr>
+              <a:buSzPct val="145000"/>
+              <a:buFont typeface="Arial"/>
+              <a:buChar char="•"/>
+              <a:defRPr sz="2400" kern="1200" cap="none">
+                <a:solidFill>
+                  <a:schemeClr val="tx1"/>
+                </a:solidFill>
+                <a:effectLst/>
+                <a:latin typeface="+mn-lt"/>
+                <a:ea typeface="+mn-ea"/>
+                <a:cs typeface="+mn-cs"/>
+              </a:defRPr>
+            </a:lvl1pPr>
+            <a:lvl2pPr marL="742950" indent="-285750" algn="l" defTabSz="457200" rtl="0" eaLnBrk="1" latinLnBrk="0" hangingPunct="1">
+              <a:spcBef>
+                <a:spcPct val="20000"/>
+              </a:spcBef>
+              <a:spcAft>
+                <a:spcPts val="600"/>
+              </a:spcAft>
+              <a:buClr>
+                <a:schemeClr val="accent1">
+                  <a:lumMod val="75000"/>
+                </a:schemeClr>
+              </a:buClr>
+              <a:buSzPct val="145000"/>
+              <a:buFont typeface="Arial"/>
+              <a:buChar char="•"/>
+              <a:defRPr sz="2000" kern="1200" cap="none">
+                <a:solidFill>
+                  <a:schemeClr val="tx1"/>
+                </a:solidFill>
+                <a:effectLst/>
+                <a:latin typeface="+mn-lt"/>
+                <a:ea typeface="+mn-ea"/>
+                <a:cs typeface="+mn-cs"/>
+              </a:defRPr>
+            </a:lvl2pPr>
+            <a:lvl3pPr marL="1200150" indent="-285750" algn="l" defTabSz="457200" rtl="0" eaLnBrk="1" latinLnBrk="0" hangingPunct="1">
+              <a:spcBef>
+                <a:spcPct val="20000"/>
+              </a:spcBef>
+              <a:spcAft>
+                <a:spcPts val="600"/>
+              </a:spcAft>
+              <a:buClr>
+                <a:schemeClr val="accent1">
+                  <a:lumMod val="75000"/>
+                </a:schemeClr>
+              </a:buClr>
+              <a:buSzPct val="145000"/>
+              <a:buFont typeface="Arial"/>
+              <a:buChar char="•"/>
+              <a:defRPr sz="1800" kern="1200" cap="none">
+                <a:solidFill>
+                  <a:schemeClr val="tx1"/>
+                </a:solidFill>
+                <a:effectLst/>
+                <a:latin typeface="+mn-lt"/>
+                <a:ea typeface="+mn-ea"/>
+                <a:cs typeface="+mn-cs"/>
+              </a:defRPr>
+            </a:lvl3pPr>
+            <a:lvl4pPr marL="1543050" indent="-171450" algn="l" defTabSz="457200" rtl="0" eaLnBrk="1" latinLnBrk="0" hangingPunct="1">
+              <a:spcBef>
+                <a:spcPct val="20000"/>
+              </a:spcBef>
+              <a:spcAft>
+                <a:spcPts val="600"/>
+              </a:spcAft>
+              <a:buClr>
+                <a:schemeClr val="accent1">
+                  <a:lumMod val="75000"/>
+                </a:schemeClr>
+              </a:buClr>
+              <a:buSzPct val="145000"/>
+              <a:buFont typeface="Arial"/>
+              <a:buChar char="•"/>
+              <a:defRPr sz="1600" kern="1200" cap="none">
+                <a:solidFill>
+                  <a:schemeClr val="tx1"/>
+                </a:solidFill>
+                <a:effectLst/>
+                <a:latin typeface="+mn-lt"/>
+                <a:ea typeface="+mn-ea"/>
+                <a:cs typeface="+mn-cs"/>
+              </a:defRPr>
+            </a:lvl4pPr>
+            <a:lvl5pPr marL="2000250" indent="-171450" algn="l" defTabSz="457200" rtl="0" eaLnBrk="1" latinLnBrk="0" hangingPunct="1">
+              <a:spcBef>
+                <a:spcPct val="20000"/>
+              </a:spcBef>
+              <a:spcAft>
+                <a:spcPts val="600"/>
+              </a:spcAft>
+              <a:buClr>
+                <a:schemeClr val="accent1">
+                  <a:lumMod val="75000"/>
+                </a:schemeClr>
+              </a:buClr>
+              <a:buSzPct val="145000"/>
+              <a:buFont typeface="Arial"/>
+              <a:buChar char="•"/>
+              <a:defRPr sz="1400" kern="1200" cap="none">
+                <a:solidFill>
+                  <a:schemeClr val="tx1"/>
+                </a:solidFill>
+                <a:effectLst/>
+                <a:latin typeface="+mn-lt"/>
+                <a:ea typeface="+mn-ea"/>
+                <a:cs typeface="+mn-cs"/>
+              </a:defRPr>
+            </a:lvl5pPr>
+            <a:lvl6pPr marL="2514600" indent="-228600" algn="l" defTabSz="457200" rtl="0" eaLnBrk="1" latinLnBrk="0" hangingPunct="1">
+              <a:spcBef>
+                <a:spcPct val="20000"/>
+              </a:spcBef>
+              <a:spcAft>
+                <a:spcPts val="600"/>
+              </a:spcAft>
+              <a:buClr>
+                <a:schemeClr val="accent1">
+                  <a:lumMod val="75000"/>
+                </a:schemeClr>
+              </a:buClr>
+              <a:buSzPct val="145000"/>
+              <a:buFont typeface="Arial"/>
+              <a:buChar char="•"/>
+              <a:defRPr sz="1400" kern="1200" cap="none">
+                <a:solidFill>
+                  <a:schemeClr val="tx1"/>
+                </a:solidFill>
+                <a:effectLst/>
+                <a:latin typeface="+mn-lt"/>
+                <a:ea typeface="+mn-ea"/>
+                <a:cs typeface="+mn-cs"/>
+              </a:defRPr>
+            </a:lvl6pPr>
+            <a:lvl7pPr marL="2971800" indent="-228600" algn="l" defTabSz="457200" rtl="0" eaLnBrk="1" latinLnBrk="0" hangingPunct="1">
+              <a:spcBef>
+                <a:spcPct val="20000"/>
+              </a:spcBef>
+              <a:spcAft>
+                <a:spcPts val="600"/>
+              </a:spcAft>
+              <a:buClr>
+                <a:schemeClr val="accent1">
+                  <a:lumMod val="75000"/>
+                </a:schemeClr>
+              </a:buClr>
+              <a:buSzPct val="145000"/>
+              <a:buFont typeface="Arial"/>
+              <a:buChar char="•"/>
+              <a:defRPr sz="1400" kern="1200" cap="none">
+                <a:solidFill>
+                  <a:schemeClr val="tx1"/>
+                </a:solidFill>
+                <a:effectLst/>
+                <a:latin typeface="+mn-lt"/>
+                <a:ea typeface="+mn-ea"/>
+                <a:cs typeface="+mn-cs"/>
+              </a:defRPr>
+            </a:lvl7pPr>
+            <a:lvl8pPr marL="3429000" indent="-228600" algn="l" defTabSz="457200" rtl="0" eaLnBrk="1" latinLnBrk="0" hangingPunct="1">
+              <a:spcBef>
+                <a:spcPct val="20000"/>
+              </a:spcBef>
+              <a:spcAft>
+                <a:spcPts val="600"/>
+              </a:spcAft>
+              <a:buClr>
+                <a:schemeClr val="accent1">
+                  <a:lumMod val="75000"/>
+                </a:schemeClr>
+              </a:buClr>
+              <a:buSzPct val="145000"/>
+              <a:buFont typeface="Arial"/>
+              <a:buChar char="•"/>
+              <a:defRPr sz="1400" kern="1200" cap="none">
+                <a:solidFill>
+                  <a:schemeClr val="tx1"/>
+                </a:solidFill>
+                <a:effectLst/>
+                <a:latin typeface="+mn-lt"/>
+                <a:ea typeface="+mn-ea"/>
+                <a:cs typeface="+mn-cs"/>
+              </a:defRPr>
+            </a:lvl8pPr>
+            <a:lvl9pPr marL="3886200" indent="-228600" algn="l" defTabSz="457200" rtl="0" eaLnBrk="1" latinLnBrk="0" hangingPunct="1">
+              <a:spcBef>
+                <a:spcPct val="20000"/>
+              </a:spcBef>
+              <a:spcAft>
+                <a:spcPts val="600"/>
+              </a:spcAft>
+              <a:buClr>
+                <a:schemeClr val="accent1">
+                  <a:lumMod val="75000"/>
+                </a:schemeClr>
+              </a:buClr>
+              <a:buSzPct val="145000"/>
+              <a:buFont typeface="Arial"/>
+              <a:buChar char="•"/>
+              <a:defRPr sz="1400" kern="1200" cap="none">
+                <a:solidFill>
+                  <a:schemeClr val="tx1"/>
+                </a:solidFill>
+                <a:effectLst/>
+                <a:latin typeface="+mn-lt"/>
+                <a:ea typeface="+mn-ea"/>
+                <a:cs typeface="+mn-cs"/>
+              </a:defRPr>
+            </a:lvl9pPr>
+          </a:lstStyle>
+          <a:p>
+            <a:pPr marL="0" indent="0">
+              <a:buFont typeface="Arial"/>
+              <a:buNone/>
+            </a:pPr>
+            <a:r>
+              <a:rPr lang="cs-CZ" sz="1600" dirty="0" smtClean="0"/>
+              <a:t>Pin 12</a:t>
+            </a:r>
+            <a:endParaRPr lang="cs-CZ" sz="1600" dirty="0"/>
+          </a:p>
+        </p:txBody>
+      </p:sp>
+      <p:sp>
+        <p:nvSpPr>
+          <p:cNvPr id="9" name="Zástupný symbol pro obsah 1"/>
+          <p:cNvSpPr txBox="1">
+            <a:spLocks/>
+          </p:cNvSpPr>
+          <p:nvPr/>
+        </p:nvSpPr>
+        <p:spPr>
+          <a:xfrm>
+            <a:off x="4741608" y="1196676"/>
+            <a:ext cx="712135" cy="462306"/>
+          </a:xfrm>
+          <a:prstGeom prst="rect">
+            <a:avLst/>
+          </a:prstGeom>
+        </p:spPr>
+        <p:txBody>
+          <a:bodyPr vert="horz" lIns="91440" tIns="45720" rIns="91440" bIns="45720" rtlCol="0" anchor="ctr">
+            <a:normAutofit/>
+          </a:bodyPr>
+          <a:lstStyle>
+            <a:lvl1pPr marL="285750" indent="-285750" algn="l" defTabSz="457200" rtl="0" eaLnBrk="1" latinLnBrk="0" hangingPunct="1">
+              <a:spcBef>
+                <a:spcPct val="20000"/>
+              </a:spcBef>
+              <a:spcAft>
+                <a:spcPts val="600"/>
+              </a:spcAft>
+              <a:buClr>
+                <a:schemeClr val="accent1">
+                  <a:lumMod val="75000"/>
+                </a:schemeClr>
+              </a:buClr>
+              <a:buSzPct val="145000"/>
+              <a:buFont typeface="Arial"/>
+              <a:buChar char="•"/>
+              <a:defRPr sz="2400" kern="1200" cap="none">
+                <a:solidFill>
+                  <a:schemeClr val="tx1"/>
+                </a:solidFill>
+                <a:effectLst/>
+                <a:latin typeface="+mn-lt"/>
+                <a:ea typeface="+mn-ea"/>
+                <a:cs typeface="+mn-cs"/>
+              </a:defRPr>
+            </a:lvl1pPr>
+            <a:lvl2pPr marL="742950" indent="-285750" algn="l" defTabSz="457200" rtl="0" eaLnBrk="1" latinLnBrk="0" hangingPunct="1">
+              <a:spcBef>
+                <a:spcPct val="20000"/>
+              </a:spcBef>
+              <a:spcAft>
+                <a:spcPts val="600"/>
+              </a:spcAft>
+              <a:buClr>
+                <a:schemeClr val="accent1">
+                  <a:lumMod val="75000"/>
+                </a:schemeClr>
+              </a:buClr>
+              <a:buSzPct val="145000"/>
+              <a:buFont typeface="Arial"/>
+              <a:buChar char="•"/>
+              <a:defRPr sz="2000" kern="1200" cap="none">
+                <a:solidFill>
+                  <a:schemeClr val="tx1"/>
+                </a:solidFill>
+                <a:effectLst/>
+                <a:latin typeface="+mn-lt"/>
+                <a:ea typeface="+mn-ea"/>
+                <a:cs typeface="+mn-cs"/>
+              </a:defRPr>
+            </a:lvl2pPr>
+            <a:lvl3pPr marL="1200150" indent="-285750" algn="l" defTabSz="457200" rtl="0" eaLnBrk="1" latinLnBrk="0" hangingPunct="1">
+              <a:spcBef>
+                <a:spcPct val="20000"/>
+              </a:spcBef>
+              <a:spcAft>
+                <a:spcPts val="600"/>
+              </a:spcAft>
+              <a:buClr>
+                <a:schemeClr val="accent1">
+                  <a:lumMod val="75000"/>
+                </a:schemeClr>
+              </a:buClr>
+              <a:buSzPct val="145000"/>
+              <a:buFont typeface="Arial"/>
+              <a:buChar char="•"/>
+              <a:defRPr sz="1800" kern="1200" cap="none">
+                <a:solidFill>
+                  <a:schemeClr val="tx1"/>
+                </a:solidFill>
+                <a:effectLst/>
+                <a:latin typeface="+mn-lt"/>
+                <a:ea typeface="+mn-ea"/>
+                <a:cs typeface="+mn-cs"/>
+              </a:defRPr>
+            </a:lvl3pPr>
+            <a:lvl4pPr marL="1543050" indent="-171450" algn="l" defTabSz="457200" rtl="0" eaLnBrk="1" latinLnBrk="0" hangingPunct="1">
+              <a:spcBef>
+                <a:spcPct val="20000"/>
+              </a:spcBef>
+              <a:spcAft>
+                <a:spcPts val="600"/>
+              </a:spcAft>
+              <a:buClr>
+                <a:schemeClr val="accent1">
+                  <a:lumMod val="75000"/>
+                </a:schemeClr>
+              </a:buClr>
+              <a:buSzPct val="145000"/>
+              <a:buFont typeface="Arial"/>
+              <a:buChar char="•"/>
+              <a:defRPr sz="1600" kern="1200" cap="none">
+                <a:solidFill>
+                  <a:schemeClr val="tx1"/>
+                </a:solidFill>
+                <a:effectLst/>
+                <a:latin typeface="+mn-lt"/>
+                <a:ea typeface="+mn-ea"/>
+                <a:cs typeface="+mn-cs"/>
+              </a:defRPr>
+            </a:lvl4pPr>
+            <a:lvl5pPr marL="2000250" indent="-171450" algn="l" defTabSz="457200" rtl="0" eaLnBrk="1" latinLnBrk="0" hangingPunct="1">
+              <a:spcBef>
+                <a:spcPct val="20000"/>
+              </a:spcBef>
+              <a:spcAft>
+                <a:spcPts val="600"/>
+              </a:spcAft>
+              <a:buClr>
+                <a:schemeClr val="accent1">
+                  <a:lumMod val="75000"/>
+                </a:schemeClr>
+              </a:buClr>
+              <a:buSzPct val="145000"/>
+              <a:buFont typeface="Arial"/>
+              <a:buChar char="•"/>
+              <a:defRPr sz="1400" kern="1200" cap="none">
+                <a:solidFill>
+                  <a:schemeClr val="tx1"/>
+                </a:solidFill>
+                <a:effectLst/>
+                <a:latin typeface="+mn-lt"/>
+                <a:ea typeface="+mn-ea"/>
+                <a:cs typeface="+mn-cs"/>
+              </a:defRPr>
+            </a:lvl5pPr>
+            <a:lvl6pPr marL="2514600" indent="-228600" algn="l" defTabSz="457200" rtl="0" eaLnBrk="1" latinLnBrk="0" hangingPunct="1">
+              <a:spcBef>
+                <a:spcPct val="20000"/>
+              </a:spcBef>
+              <a:spcAft>
+                <a:spcPts val="600"/>
+              </a:spcAft>
+              <a:buClr>
+                <a:schemeClr val="accent1">
+                  <a:lumMod val="75000"/>
+                </a:schemeClr>
+              </a:buClr>
+              <a:buSzPct val="145000"/>
+              <a:buFont typeface="Arial"/>
+              <a:buChar char="•"/>
+              <a:defRPr sz="1400" kern="1200" cap="none">
+                <a:solidFill>
+                  <a:schemeClr val="tx1"/>
+                </a:solidFill>
+                <a:effectLst/>
+                <a:latin typeface="+mn-lt"/>
+                <a:ea typeface="+mn-ea"/>
+                <a:cs typeface="+mn-cs"/>
+              </a:defRPr>
+            </a:lvl6pPr>
+            <a:lvl7pPr marL="2971800" indent="-228600" algn="l" defTabSz="457200" rtl="0" eaLnBrk="1" latinLnBrk="0" hangingPunct="1">
+              <a:spcBef>
+                <a:spcPct val="20000"/>
+              </a:spcBef>
+              <a:spcAft>
+                <a:spcPts val="600"/>
+              </a:spcAft>
+              <a:buClr>
+                <a:schemeClr val="accent1">
+                  <a:lumMod val="75000"/>
+                </a:schemeClr>
+              </a:buClr>
+              <a:buSzPct val="145000"/>
+              <a:buFont typeface="Arial"/>
+              <a:buChar char="•"/>
+              <a:defRPr sz="1400" kern="1200" cap="none">
+                <a:solidFill>
+                  <a:schemeClr val="tx1"/>
+                </a:solidFill>
+                <a:effectLst/>
+                <a:latin typeface="+mn-lt"/>
+                <a:ea typeface="+mn-ea"/>
+                <a:cs typeface="+mn-cs"/>
+              </a:defRPr>
+            </a:lvl7pPr>
+            <a:lvl8pPr marL="3429000" indent="-228600" algn="l" defTabSz="457200" rtl="0" eaLnBrk="1" latinLnBrk="0" hangingPunct="1">
+              <a:spcBef>
+                <a:spcPct val="20000"/>
+              </a:spcBef>
+              <a:spcAft>
+                <a:spcPts val="600"/>
+              </a:spcAft>
+              <a:buClr>
+                <a:schemeClr val="accent1">
+                  <a:lumMod val="75000"/>
+                </a:schemeClr>
+              </a:buClr>
+              <a:buSzPct val="145000"/>
+              <a:buFont typeface="Arial"/>
+              <a:buChar char="•"/>
+              <a:defRPr sz="1400" kern="1200" cap="none">
+                <a:solidFill>
+                  <a:schemeClr val="tx1"/>
+                </a:solidFill>
+                <a:effectLst/>
+                <a:latin typeface="+mn-lt"/>
+                <a:ea typeface="+mn-ea"/>
+                <a:cs typeface="+mn-cs"/>
+              </a:defRPr>
+            </a:lvl8pPr>
+            <a:lvl9pPr marL="3886200" indent="-228600" algn="l" defTabSz="457200" rtl="0" eaLnBrk="1" latinLnBrk="0" hangingPunct="1">
+              <a:spcBef>
+                <a:spcPct val="20000"/>
+              </a:spcBef>
+              <a:spcAft>
+                <a:spcPts val="600"/>
+              </a:spcAft>
+              <a:buClr>
+                <a:schemeClr val="accent1">
+                  <a:lumMod val="75000"/>
+                </a:schemeClr>
+              </a:buClr>
+              <a:buSzPct val="145000"/>
+              <a:buFont typeface="Arial"/>
+              <a:buChar char="•"/>
+              <a:defRPr sz="1400" kern="1200" cap="none">
+                <a:solidFill>
+                  <a:schemeClr val="tx1"/>
+                </a:solidFill>
+                <a:effectLst/>
+                <a:latin typeface="+mn-lt"/>
+                <a:ea typeface="+mn-ea"/>
+                <a:cs typeface="+mn-cs"/>
+              </a:defRPr>
+            </a:lvl9pPr>
+          </a:lstStyle>
+          <a:p>
+            <a:pPr marL="0" indent="0">
+              <a:buFont typeface="Arial"/>
+              <a:buNone/>
+            </a:pPr>
+            <a:r>
+              <a:rPr lang="cs-CZ" sz="1600" dirty="0" smtClean="0"/>
+              <a:t>Pin 27</a:t>
+            </a:r>
+            <a:endParaRPr lang="cs-CZ" sz="1600" dirty="0"/>
+          </a:p>
+        </p:txBody>
+      </p:sp>
+      <p:sp>
+        <p:nvSpPr>
+          <p:cNvPr id="5" name="Obdélník 4"/>
           <p:cNvSpPr/>
           <p:nvPr/>
         </p:nvSpPr>
         <p:spPr>
           <a:xfrm>
-            <a:off x="4091528" y="1485899"/>
-            <a:ext cx="1035303" cy="364331"/>
+            <a:off x="6137598" y="1246287"/>
+            <a:ext cx="712135" cy="363084"/>
           </a:xfrm>
           <a:prstGeom prst="rect">
             <a:avLst/>
@@ -14343,10 +14243,148 @@
           </a:p>
         </p:txBody>
       </p:sp>
+      <p:sp>
+        <p:nvSpPr>
+          <p:cNvPr id="10" name="Obdélník 9"/>
+          <p:cNvSpPr/>
+          <p:nvPr/>
+        </p:nvSpPr>
+        <p:spPr>
+          <a:xfrm>
+            <a:off x="7875682" y="6000549"/>
+            <a:ext cx="712135" cy="462306"/>
+          </a:xfrm>
+          <a:prstGeom prst="rect">
+            <a:avLst/>
+          </a:prstGeom>
+          <a:noFill/>
+          <a:ln w="38100">
+            <a:solidFill>
+              <a:srgbClr val="FF0000"/>
+            </a:solidFill>
+          </a:ln>
+        </p:spPr>
+        <p:style>
+          <a:lnRef idx="2">
+            <a:schemeClr val="accent1">
+              <a:shade val="50000"/>
+            </a:schemeClr>
+          </a:lnRef>
+          <a:fillRef idx="1">
+            <a:schemeClr val="accent1"/>
+          </a:fillRef>
+          <a:effectRef idx="0">
+            <a:schemeClr val="accent1"/>
+          </a:effectRef>
+          <a:fontRef idx="minor">
+            <a:schemeClr val="lt1"/>
+          </a:fontRef>
+        </p:style>
+        <p:txBody>
+          <a:bodyPr rtlCol="0" anchor="ctr"/>
+          <a:lstStyle/>
+          <a:p>
+            <a:pPr algn="ctr"/>
+            <a:endParaRPr lang="cs-CZ"/>
+          </a:p>
+        </p:txBody>
+      </p:sp>
+      <p:sp>
+        <p:nvSpPr>
+          <p:cNvPr id="11" name="Obdélník 10"/>
+          <p:cNvSpPr/>
+          <p:nvPr/>
+        </p:nvSpPr>
+        <p:spPr>
+          <a:xfrm>
+            <a:off x="5425462" y="1246287"/>
+            <a:ext cx="712135" cy="363084"/>
+          </a:xfrm>
+          <a:prstGeom prst="rect">
+            <a:avLst/>
+          </a:prstGeom>
+          <a:noFill/>
+          <a:ln w="38100">
+            <a:solidFill>
+              <a:srgbClr val="FF0000"/>
+            </a:solidFill>
+          </a:ln>
+        </p:spPr>
+        <p:style>
+          <a:lnRef idx="2">
+            <a:schemeClr val="accent1">
+              <a:shade val="50000"/>
+            </a:schemeClr>
+          </a:lnRef>
+          <a:fillRef idx="1">
+            <a:schemeClr val="accent1"/>
+          </a:fillRef>
+          <a:effectRef idx="0">
+            <a:schemeClr val="accent1"/>
+          </a:effectRef>
+          <a:fontRef idx="minor">
+            <a:schemeClr val="lt1"/>
+          </a:fontRef>
+        </p:style>
+        <p:txBody>
+          <a:bodyPr rtlCol="0" anchor="ctr"/>
+          <a:lstStyle/>
+          <a:p>
+            <a:pPr algn="ctr"/>
+            <a:endParaRPr lang="cs-CZ"/>
+          </a:p>
+        </p:txBody>
+      </p:sp>
+      <p:sp>
+        <p:nvSpPr>
+          <p:cNvPr id="12" name="Obdélník 11"/>
+          <p:cNvSpPr/>
+          <p:nvPr/>
+        </p:nvSpPr>
+        <p:spPr>
+          <a:xfrm>
+            <a:off x="4704593" y="1246287"/>
+            <a:ext cx="712135" cy="363084"/>
+          </a:xfrm>
+          <a:prstGeom prst="rect">
+            <a:avLst/>
+          </a:prstGeom>
+          <a:noFill/>
+          <a:ln w="38100">
+            <a:solidFill>
+              <a:srgbClr val="FF0000"/>
+            </a:solidFill>
+          </a:ln>
+        </p:spPr>
+        <p:style>
+          <a:lnRef idx="2">
+            <a:schemeClr val="accent1">
+              <a:shade val="50000"/>
+            </a:schemeClr>
+          </a:lnRef>
+          <a:fillRef idx="1">
+            <a:schemeClr val="accent1"/>
+          </a:fillRef>
+          <a:effectRef idx="0">
+            <a:schemeClr val="accent1"/>
+          </a:effectRef>
+          <a:fontRef idx="minor">
+            <a:schemeClr val="lt1"/>
+          </a:fontRef>
+        </p:style>
+        <p:txBody>
+          <a:bodyPr rtlCol="0" anchor="ctr"/>
+          <a:lstStyle/>
+          <a:p>
+            <a:pPr algn="ctr"/>
+            <a:endParaRPr lang="cs-CZ"/>
+          </a:p>
+        </p:txBody>
+      </p:sp>
     </p:spTree>
     <p:extLst>
       <p:ext uri="{BB962C8B-B14F-4D97-AF65-F5344CB8AC3E}">
-        <p14:creationId xmlns:p14="http://schemas.microsoft.com/office/powerpoint/2010/main" val="2944603715"/>
+        <p14:creationId xmlns:p14="http://schemas.microsoft.com/office/powerpoint/2010/main" val="1620030877"/>
       </p:ext>
     </p:extLst>
   </p:cSld>
@@ -14424,7 +14462,7 @@
         </p:spPr>
         <p:txBody>
           <a:bodyPr vert="horz" lIns="91440" tIns="45720" rIns="91440" bIns="45720" rtlCol="0" anchor="ctr">
-            <a:normAutofit/>
+            <a:normAutofit fontScale="62500" lnSpcReduction="20000"/>
           </a:bodyPr>
           <a:lstStyle>
             <a:lvl1pPr algn="ctr" defTabSz="457200" rtl="0" eaLnBrk="1" latinLnBrk="0" hangingPunct="1">
@@ -14505,15 +14543,11 @@
           <a:p>
             <a:r>
               <a:rPr lang="cs-CZ" dirty="0"/>
-              <a:t>Nastavení </a:t>
-            </a:r>
-            <a:r>
-              <a:rPr lang="cs-CZ" dirty="0" err="1"/>
-              <a:t>Blynk</a:t>
-            </a:r>
-            <a:r>
-              <a:rPr lang="cs-CZ" dirty="0"/>
-              <a:t> aplikace </a:t>
+              <a:t>Nastavení Blynk </a:t>
+            </a:r>
+            <a:r>
+              <a:rPr lang="cs-CZ" dirty="0" smtClean="0"/>
+              <a:t>aplikace pro Blynk server ve FL </a:t>
             </a:r>
             <a:endParaRPr lang="cs-CZ" dirty="0"/>
           </a:p>
@@ -14546,7 +14580,6 @@
               <a:rPr lang="cs-CZ" dirty="0" smtClean="0"/>
               <a:t>mtm.fablabbrno.cz</a:t>
             </a:r>
-            <a:endParaRPr lang="cs-CZ" dirty="0" smtClean="0"/>
           </a:p>
           <a:p>
             <a:pPr lvl="1"/>

</xml_diff>